<commit_message>
Updated the taxes pp for megan
</commit_message>
<xml_diff>
--- a/Powerpoint/COS 214 Project powerpoint_Taxes.pptx
+++ b/Powerpoint/COS 214 Project powerpoint_Taxes.pptx
@@ -15,21 +15,23 @@
     <p:sldId id="261" r:id="rId9"/>
     <p:sldId id="263" r:id="rId10"/>
     <p:sldId id="268" r:id="rId11"/>
-    <p:sldId id="264" r:id="rId12"/>
-    <p:sldId id="265" r:id="rId13"/>
-    <p:sldId id="266" r:id="rId14"/>
-    <p:sldId id="269" r:id="rId15"/>
-    <p:sldId id="270" r:id="rId16"/>
-    <p:sldId id="271" r:id="rId17"/>
-    <p:sldId id="272" r:id="rId18"/>
-    <p:sldId id="273" r:id="rId19"/>
-    <p:sldId id="274" r:id="rId20"/>
-    <p:sldId id="275" r:id="rId21"/>
-    <p:sldId id="276" r:id="rId22"/>
-    <p:sldId id="277" r:id="rId23"/>
-    <p:sldId id="278" r:id="rId24"/>
-    <p:sldId id="279" r:id="rId25"/>
-    <p:sldId id="280" r:id="rId26"/>
+    <p:sldId id="281" r:id="rId12"/>
+    <p:sldId id="264" r:id="rId13"/>
+    <p:sldId id="265" r:id="rId14"/>
+    <p:sldId id="266" r:id="rId15"/>
+    <p:sldId id="269" r:id="rId16"/>
+    <p:sldId id="270" r:id="rId17"/>
+    <p:sldId id="271" r:id="rId18"/>
+    <p:sldId id="282" r:id="rId19"/>
+    <p:sldId id="273" r:id="rId20"/>
+    <p:sldId id="274" r:id="rId21"/>
+    <p:sldId id="283" r:id="rId22"/>
+    <p:sldId id="275" r:id="rId23"/>
+    <p:sldId id="276" r:id="rId24"/>
+    <p:sldId id="277" r:id="rId25"/>
+    <p:sldId id="278" r:id="rId26"/>
+    <p:sldId id="279" r:id="rId27"/>
+    <p:sldId id="280" r:id="rId28"/>
   </p:sldIdLst>
   <p:sldSz cx="12192000" cy="6858000"/>
   <p:notesSz cx="6858000" cy="9144000"/>
@@ -134,6 +136,132 @@
     </p:ext>
   </p:extLst>
 </p:presentation>
+</file>
+
+<file path=ppt/changesInfos/changesInfo1.xml><?xml version="1.0" encoding="utf-8"?>
+<pc:chgInfo xmlns:a="http://schemas.openxmlformats.org/drawingml/2006/main" xmlns:r="http://schemas.openxmlformats.org/officeDocument/2006/relationships" xmlns:ac="http://schemas.microsoft.com/office/drawing/2013/main/command" xmlns:pc="http://schemas.microsoft.com/office/powerpoint/2013/main/command">
+  <pc:docChgLst>
+    <pc:chgData name="James Neale" userId="510405ac2a4065db" providerId="LiveId" clId="{AF72FDA4-D9C2-4BAE-8195-B155CC9A54AD}"/>
+    <pc:docChg chg="undo custSel addSld delSld modSld sldOrd">
+      <pc:chgData name="James Neale" userId="510405ac2a4065db" providerId="LiveId" clId="{AF72FDA4-D9C2-4BAE-8195-B155CC9A54AD}" dt="2024-11-04T12:56:56.134" v="2072" actId="20577"/>
+      <pc:docMkLst>
+        <pc:docMk/>
+      </pc:docMkLst>
+      <pc:sldChg chg="modSp mod">
+        <pc:chgData name="James Neale" userId="510405ac2a4065db" providerId="LiveId" clId="{AF72FDA4-D9C2-4BAE-8195-B155CC9A54AD}" dt="2024-11-04T12:37:59.270" v="878" actId="20577"/>
+        <pc:sldMkLst>
+          <pc:docMk/>
+          <pc:sldMk cId="619145814" sldId="261"/>
+        </pc:sldMkLst>
+        <pc:spChg chg="mod">
+          <ac:chgData name="James Neale" userId="510405ac2a4065db" providerId="LiveId" clId="{AF72FDA4-D9C2-4BAE-8195-B155CC9A54AD}" dt="2024-11-04T12:37:59.270" v="878" actId="20577"/>
+          <ac:spMkLst>
+            <pc:docMk/>
+            <pc:sldMk cId="619145814" sldId="261"/>
+            <ac:spMk id="3" creationId="{FBE421A1-8CA9-BDB6-9547-8B0FBA08922D}"/>
+          </ac:spMkLst>
+        </pc:spChg>
+      </pc:sldChg>
+      <pc:sldChg chg="modSp mod">
+        <pc:chgData name="James Neale" userId="510405ac2a4065db" providerId="LiveId" clId="{AF72FDA4-D9C2-4BAE-8195-B155CC9A54AD}" dt="2024-11-04T12:38:16.153" v="887" actId="27636"/>
+        <pc:sldMkLst>
+          <pc:docMk/>
+          <pc:sldMk cId="2517290335" sldId="268"/>
+        </pc:sldMkLst>
+        <pc:spChg chg="mod">
+          <ac:chgData name="James Neale" userId="510405ac2a4065db" providerId="LiveId" clId="{AF72FDA4-D9C2-4BAE-8195-B155CC9A54AD}" dt="2024-11-04T12:38:16.153" v="887" actId="27636"/>
+          <ac:spMkLst>
+            <pc:docMk/>
+            <pc:sldMk cId="2517290335" sldId="268"/>
+            <ac:spMk id="5" creationId="{A8DA472F-0C70-4ED9-AF3E-F0611D1C4C47}"/>
+          </ac:spMkLst>
+        </pc:spChg>
+      </pc:sldChg>
+      <pc:sldChg chg="del">
+        <pc:chgData name="James Neale" userId="510405ac2a4065db" providerId="LiveId" clId="{AF72FDA4-D9C2-4BAE-8195-B155CC9A54AD}" dt="2024-11-04T12:52:49.214" v="1834" actId="47"/>
+        <pc:sldMkLst>
+          <pc:docMk/>
+          <pc:sldMk cId="2114280471" sldId="272"/>
+        </pc:sldMkLst>
+      </pc:sldChg>
+      <pc:sldChg chg="modSp mod">
+        <pc:chgData name="James Neale" userId="510405ac2a4065db" providerId="LiveId" clId="{AF72FDA4-D9C2-4BAE-8195-B155CC9A54AD}" dt="2024-11-04T12:52:29.758" v="1833" actId="20577"/>
+        <pc:sldMkLst>
+          <pc:docMk/>
+          <pc:sldMk cId="1250620884" sldId="274"/>
+        </pc:sldMkLst>
+        <pc:spChg chg="mod">
+          <ac:chgData name="James Neale" userId="510405ac2a4065db" providerId="LiveId" clId="{AF72FDA4-D9C2-4BAE-8195-B155CC9A54AD}" dt="2024-11-04T12:52:29.758" v="1833" actId="20577"/>
+          <ac:spMkLst>
+            <pc:docMk/>
+            <pc:sldMk cId="1250620884" sldId="274"/>
+            <ac:spMk id="3" creationId="{8474ED0A-B0FA-EE00-EEFD-4FEBC4A64FAF}"/>
+          </ac:spMkLst>
+        </pc:spChg>
+      </pc:sldChg>
+      <pc:sldChg chg="modSp add mod">
+        <pc:chgData name="James Neale" userId="510405ac2a4065db" providerId="LiveId" clId="{AF72FDA4-D9C2-4BAE-8195-B155CC9A54AD}" dt="2024-11-04T12:38:26.831" v="889"/>
+        <pc:sldMkLst>
+          <pc:docMk/>
+          <pc:sldMk cId="776560291" sldId="281"/>
+        </pc:sldMkLst>
+        <pc:spChg chg="mod">
+          <ac:chgData name="James Neale" userId="510405ac2a4065db" providerId="LiveId" clId="{AF72FDA4-D9C2-4BAE-8195-B155CC9A54AD}" dt="2024-11-04T12:38:26.831" v="889"/>
+          <ac:spMkLst>
+            <pc:docMk/>
+            <pc:sldMk cId="776560291" sldId="281"/>
+            <ac:spMk id="5" creationId="{AE4C9F20-6477-04D4-3B63-3DE3CB40092E}"/>
+          </ac:spMkLst>
+        </pc:spChg>
+      </pc:sldChg>
+      <pc:sldChg chg="modSp add mod ord">
+        <pc:chgData name="James Neale" userId="510405ac2a4065db" providerId="LiveId" clId="{AF72FDA4-D9C2-4BAE-8195-B155CC9A54AD}" dt="2024-11-04T12:46:35.998" v="1261" actId="20577"/>
+        <pc:sldMkLst>
+          <pc:docMk/>
+          <pc:sldMk cId="2224821450" sldId="282"/>
+        </pc:sldMkLst>
+        <pc:spChg chg="mod">
+          <ac:chgData name="James Neale" userId="510405ac2a4065db" providerId="LiveId" clId="{AF72FDA4-D9C2-4BAE-8195-B155CC9A54AD}" dt="2024-11-04T12:46:35.998" v="1261" actId="20577"/>
+          <ac:spMkLst>
+            <pc:docMk/>
+            <pc:sldMk cId="2224821450" sldId="282"/>
+            <ac:spMk id="3" creationId="{EA1127C7-2E16-2B25-3D17-C01B5CA4F09C}"/>
+          </ac:spMkLst>
+        </pc:spChg>
+        <pc:spChg chg="mod">
+          <ac:chgData name="James Neale" userId="510405ac2a4065db" providerId="LiveId" clId="{AF72FDA4-D9C2-4BAE-8195-B155CC9A54AD}" dt="2024-11-04T12:39:24.542" v="901" actId="20577"/>
+          <ac:spMkLst>
+            <pc:docMk/>
+            <pc:sldMk cId="2224821450" sldId="282"/>
+            <ac:spMk id="4" creationId="{54749544-19A4-8A84-E03D-6CE2135F035A}"/>
+          </ac:spMkLst>
+        </pc:spChg>
+      </pc:sldChg>
+      <pc:sldChg chg="modSp add mod ord">
+        <pc:chgData name="James Neale" userId="510405ac2a4065db" providerId="LiveId" clId="{AF72FDA4-D9C2-4BAE-8195-B155CC9A54AD}" dt="2024-11-04T12:56:56.134" v="2072" actId="20577"/>
+        <pc:sldMkLst>
+          <pc:docMk/>
+          <pc:sldMk cId="466742148" sldId="283"/>
+        </pc:sldMkLst>
+        <pc:spChg chg="mod">
+          <ac:chgData name="James Neale" userId="510405ac2a4065db" providerId="LiveId" clId="{AF72FDA4-D9C2-4BAE-8195-B155CC9A54AD}" dt="2024-11-04T12:56:56.134" v="2072" actId="20577"/>
+          <ac:spMkLst>
+            <pc:docMk/>
+            <pc:sldMk cId="466742148" sldId="283"/>
+            <ac:spMk id="3" creationId="{35FC104A-642F-EAE9-3609-C074F1718249}"/>
+          </ac:spMkLst>
+        </pc:spChg>
+      </pc:sldChg>
+      <pc:sldChg chg="add del">
+        <pc:chgData name="James Neale" userId="510405ac2a4065db" providerId="LiveId" clId="{AF72FDA4-D9C2-4BAE-8195-B155CC9A54AD}" dt="2024-11-04T12:53:00.875" v="1836" actId="47"/>
+        <pc:sldMkLst>
+          <pc:docMk/>
+          <pc:sldMk cId="4244538330" sldId="283"/>
+        </pc:sldMkLst>
+      </pc:sldChg>
+    </pc:docChg>
+  </pc:docChgLst>
+</pc:chgInfo>
 </file>
 
 <file path=ppt/slideLayouts/slideLayout1.xml><?xml version="1.0" encoding="utf-8"?>
@@ -3578,17 +3706,37 @@
         </p:nvSpPr>
         <p:spPr>
           <a:xfrm>
-            <a:off x="838200" y="1825625"/>
-            <a:ext cx="10515600" cy="4351338"/>
+            <a:off x="838200" y="1825624"/>
+            <a:ext cx="10515600" cy="4816715"/>
           </a:xfrm>
         </p:spPr>
         <p:txBody>
-          <a:bodyPr/>
+          <a:bodyPr>
+            <a:normAutofit/>
+          </a:bodyPr>
           <a:lstStyle/>
           <a:p>
             <a:r>
               <a:rPr lang="en-ZA" dirty="0"/>
-              <a:t>Explain pattern , attributes and methods</a:t>
+              <a:t>Utilities allow the city to be cleaned and aid in the production of certain resources in the city. E.g. Powerplants increase the amount of energy that is produced.</a:t>
+            </a:r>
+          </a:p>
+          <a:p>
+            <a:r>
+              <a:rPr lang="en-ZA" dirty="0"/>
+              <a:t>Utilities implements the state design pattern. Utilities appear to change their class through the repair and malfunction functions.</a:t>
+            </a:r>
+          </a:p>
+          <a:p>
+            <a:r>
+              <a:rPr lang="en-ZA" dirty="0"/>
+              <a:t>A utility that has malfunctioned operates at a lower efficiency and can be repaired to operate at max efficiency again.</a:t>
+            </a:r>
+          </a:p>
+          <a:p>
+            <a:r>
+              <a:rPr lang="en-ZA" dirty="0"/>
+              <a:t>The government acts as the context class. Natural disasters cause utilities to malfunction. The user can choose to repair utilities when they have malfunctioned.</a:t>
             </a:r>
           </a:p>
         </p:txBody>
@@ -3607,6 +3755,188 @@
 </file>
 
 <file path=ppt/slides/slide11.xml><?xml version="1.0" encoding="utf-8"?>
+<p:sld xmlns:a="http://schemas.openxmlformats.org/drawingml/2006/main" xmlns:r="http://schemas.openxmlformats.org/officeDocument/2006/relationships" xmlns:p="http://schemas.openxmlformats.org/presentationml/2006/main">
+  <p:cSld>
+    <p:spTree>
+      <p:nvGrpSpPr>
+        <p:cNvPr id="1" name="">
+          <a:extLst>
+            <a:ext uri="{FF2B5EF4-FFF2-40B4-BE49-F238E27FC236}">
+              <a16:creationId xmlns:a16="http://schemas.microsoft.com/office/drawing/2014/main" id="{F0314053-5BD7-0522-5655-69E6646B8F31}"/>
+            </a:ext>
+          </a:extLst>
+        </p:cNvPr>
+        <p:cNvGrpSpPr/>
+        <p:nvPr/>
+      </p:nvGrpSpPr>
+      <p:grpSpPr>
+        <a:xfrm>
+          <a:off x="0" y="0"/>
+          <a:ext cx="0" cy="0"/>
+          <a:chOff x="0" y="0"/>
+          <a:chExt cx="0" cy="0"/>
+        </a:xfrm>
+      </p:grpSpPr>
+      <p:sp>
+        <p:nvSpPr>
+          <p:cNvPr id="4" name="Title 1">
+            <a:extLst>
+              <a:ext uri="{FF2B5EF4-FFF2-40B4-BE49-F238E27FC236}">
+                <a16:creationId xmlns:a16="http://schemas.microsoft.com/office/drawing/2014/main" id="{ACD34235-8572-ECDF-3813-0D741E1454CC}"/>
+              </a:ext>
+            </a:extLst>
+          </p:cNvPr>
+          <p:cNvSpPr>
+            <a:spLocks noGrp="1"/>
+          </p:cNvSpPr>
+          <p:nvPr>
+            <p:ph type="title"/>
+          </p:nvPr>
+        </p:nvSpPr>
+        <p:spPr>
+          <a:xfrm>
+            <a:off x="838200" y="365125"/>
+            <a:ext cx="10515600" cy="1325563"/>
+          </a:xfrm>
+          <a:solidFill>
+            <a:schemeClr val="accent4">
+              <a:lumMod val="60000"/>
+              <a:lumOff val="40000"/>
+            </a:schemeClr>
+          </a:solidFill>
+        </p:spPr>
+        <p:txBody>
+          <a:bodyPr>
+            <a:noAutofit/>
+          </a:bodyPr>
+          <a:lstStyle/>
+          <a:p>
+            <a:pPr algn="ctr"/>
+            <a:r>
+              <a:rPr lang="en-ZA" sz="4800" i="0" u="none" strike="noStrike" dirty="0">
+                <a:solidFill>
+                  <a:schemeClr val="bg1"/>
+                </a:solidFill>
+                <a:effectLst/>
+                <a:latin typeface="ADLaM Display" panose="02010000000000000000" pitchFamily="2" charset="0"/>
+                <a:ea typeface="ADLaM Display" panose="02010000000000000000" pitchFamily="2" charset="0"/>
+                <a:cs typeface="ADLaM Display" panose="02010000000000000000" pitchFamily="2" charset="0"/>
+              </a:rPr>
+              <a:t>Utilities</a:t>
+            </a:r>
+            <a:endParaRPr lang="en-ZA" sz="4800" dirty="0">
+              <a:solidFill>
+                <a:schemeClr val="bg1"/>
+              </a:solidFill>
+              <a:latin typeface="ADLaM Display" panose="02010000000000000000" pitchFamily="2" charset="0"/>
+              <a:ea typeface="ADLaM Display" panose="02010000000000000000" pitchFamily="2" charset="0"/>
+              <a:cs typeface="ADLaM Display" panose="02010000000000000000" pitchFamily="2" charset="0"/>
+            </a:endParaRPr>
+          </a:p>
+        </p:txBody>
+      </p:sp>
+      <p:sp>
+        <p:nvSpPr>
+          <p:cNvPr id="5" name="Content Placeholder 2">
+            <a:extLst>
+              <a:ext uri="{FF2B5EF4-FFF2-40B4-BE49-F238E27FC236}">
+                <a16:creationId xmlns:a16="http://schemas.microsoft.com/office/drawing/2014/main" id="{AE4C9F20-6477-04D4-3B63-3DE3CB40092E}"/>
+              </a:ext>
+            </a:extLst>
+          </p:cNvPr>
+          <p:cNvSpPr>
+            <a:spLocks noGrp="1"/>
+          </p:cNvSpPr>
+          <p:nvPr>
+            <p:ph idx="1"/>
+          </p:nvPr>
+        </p:nvSpPr>
+        <p:spPr>
+          <a:xfrm>
+            <a:off x="838200" y="1825624"/>
+            <a:ext cx="10515600" cy="4816715"/>
+          </a:xfrm>
+        </p:spPr>
+        <p:txBody>
+          <a:bodyPr>
+            <a:normAutofit/>
+          </a:bodyPr>
+          <a:lstStyle/>
+          <a:p>
+            <a:r>
+              <a:rPr lang="en-ZA" dirty="0"/>
+              <a:t>State: </a:t>
+            </a:r>
+            <a:r>
+              <a:rPr lang="en-ZA" dirty="0" err="1"/>
+              <a:t>PowerPlant</a:t>
+            </a:r>
+            <a:r>
+              <a:rPr lang="en-ZA" dirty="0"/>
+              <a:t>, </a:t>
+            </a:r>
+            <a:r>
+              <a:rPr lang="en-ZA" dirty="0" err="1"/>
+              <a:t>WasteManagement</a:t>
+            </a:r>
+            <a:r>
+              <a:rPr lang="en-ZA" dirty="0"/>
+              <a:t>, </a:t>
+            </a:r>
+            <a:r>
+              <a:rPr lang="en-ZA" dirty="0" err="1"/>
+              <a:t>WaterSupply</a:t>
+            </a:r>
+            <a:r>
+              <a:rPr lang="en-ZA" dirty="0"/>
+              <a:t> </a:t>
+            </a:r>
+          </a:p>
+          <a:p>
+            <a:r>
+              <a:rPr lang="en-ZA" dirty="0" err="1"/>
+              <a:t>ConcreteStates</a:t>
+            </a:r>
+            <a:r>
+              <a:rPr lang="en-ZA" dirty="0"/>
+              <a:t>: </a:t>
+            </a:r>
+            <a:r>
+              <a:rPr lang="en-ZA" dirty="0" err="1"/>
+              <a:t>FunctionalPowerPlant</a:t>
+            </a:r>
+            <a:r>
+              <a:rPr lang="en-ZA" dirty="0"/>
+              <a:t>, </a:t>
+            </a:r>
+            <a:r>
+              <a:rPr lang="en-ZA" dirty="0" err="1"/>
+              <a:t>NonFunctionalPowerPlant</a:t>
+            </a:r>
+            <a:endParaRPr lang="en-ZA" dirty="0"/>
+          </a:p>
+          <a:p>
+            <a:r>
+              <a:rPr lang="en-ZA" dirty="0"/>
+              <a:t>Context: Government</a:t>
+            </a:r>
+          </a:p>
+        </p:txBody>
+      </p:sp>
+    </p:spTree>
+    <p:extLst>
+      <p:ext uri="{BB962C8B-B14F-4D97-AF65-F5344CB8AC3E}">
+        <p14:creationId xmlns:p14="http://schemas.microsoft.com/office/powerpoint/2010/main" val="776560291"/>
+      </p:ext>
+    </p:extLst>
+  </p:cSld>
+  <p:clrMapOvr>
+    <a:masterClrMapping/>
+  </p:clrMapOvr>
+</p:sld>
+</file>
+
+<file path=ppt/slides/slide12.xml><?xml version="1.0" encoding="utf-8"?>
 <p:sld xmlns:a="http://schemas.openxmlformats.org/drawingml/2006/main" xmlns:r="http://schemas.openxmlformats.org/officeDocument/2006/relationships" xmlns:p="http://schemas.openxmlformats.org/presentationml/2006/main">
   <p:cSld>
     <p:bg>
@@ -3997,7 +4327,7 @@
 </p:sld>
 </file>
 
-<file path=ppt/slides/slide12.xml><?xml version="1.0" encoding="utf-8"?>
+<file path=ppt/slides/slide13.xml><?xml version="1.0" encoding="utf-8"?>
 <p:sld xmlns:a="http://schemas.openxmlformats.org/drawingml/2006/main" xmlns:r="http://schemas.openxmlformats.org/officeDocument/2006/relationships" xmlns:p="http://schemas.openxmlformats.org/presentationml/2006/main">
   <p:cSld>
     <p:spTree>
@@ -4131,7 +4461,7 @@
 </p:sld>
 </file>
 
-<file path=ppt/slides/slide13.xml><?xml version="1.0" encoding="utf-8"?>
+<file path=ppt/slides/slide14.xml><?xml version="1.0" encoding="utf-8"?>
 <p:sld xmlns:a="http://schemas.openxmlformats.org/drawingml/2006/main" xmlns:r="http://schemas.openxmlformats.org/officeDocument/2006/relationships" xmlns:p="http://schemas.openxmlformats.org/presentationml/2006/main">
   <p:cSld>
     <p:spTree>
@@ -4257,7 +4587,7 @@
 </p:sld>
 </file>
 
-<file path=ppt/slides/slide14.xml><?xml version="1.0" encoding="utf-8"?>
+<file path=ppt/slides/slide15.xml><?xml version="1.0" encoding="utf-8"?>
 <p:sld xmlns:a="http://schemas.openxmlformats.org/drawingml/2006/main" xmlns:r="http://schemas.openxmlformats.org/officeDocument/2006/relationships" xmlns:p="http://schemas.openxmlformats.org/presentationml/2006/main">
   <p:cSld>
     <p:bg>
@@ -4544,127 +4874,6 @@
 </p:sld>
 </file>
 
-<file path=ppt/slides/slide15.xml><?xml version="1.0" encoding="utf-8"?>
-<p:sld xmlns:a="http://schemas.openxmlformats.org/drawingml/2006/main" xmlns:r="http://schemas.openxmlformats.org/officeDocument/2006/relationships" xmlns:p="http://schemas.openxmlformats.org/presentationml/2006/main">
-  <p:cSld>
-    <p:spTree>
-      <p:nvGrpSpPr>
-        <p:cNvPr id="1" name=""/>
-        <p:cNvGrpSpPr/>
-        <p:nvPr/>
-      </p:nvGrpSpPr>
-      <p:grpSpPr>
-        <a:xfrm>
-          <a:off x="0" y="0"/>
-          <a:ext cx="0" cy="0"/>
-          <a:chOff x="0" y="0"/>
-          <a:chExt cx="0" cy="0"/>
-        </a:xfrm>
-      </p:grpSpPr>
-      <p:sp>
-        <p:nvSpPr>
-          <p:cNvPr id="4" name="Content Placeholder 2">
-            <a:extLst>
-              <a:ext uri="{FF2B5EF4-FFF2-40B4-BE49-F238E27FC236}">
-                <a16:creationId xmlns:a16="http://schemas.microsoft.com/office/drawing/2014/main" id="{7410690B-FD90-5B80-D552-6E8A2C6D5A6D}"/>
-              </a:ext>
-            </a:extLst>
-          </p:cNvPr>
-          <p:cNvSpPr>
-            <a:spLocks noGrp="1"/>
-          </p:cNvSpPr>
-          <p:nvPr>
-            <p:ph idx="1"/>
-          </p:nvPr>
-        </p:nvSpPr>
-        <p:spPr>
-          <a:xfrm>
-            <a:off x="838200" y="1825625"/>
-            <a:ext cx="10515600" cy="4351338"/>
-          </a:xfrm>
-        </p:spPr>
-        <p:txBody>
-          <a:bodyPr/>
-          <a:lstStyle/>
-          <a:p>
-            <a:r>
-              <a:rPr lang="en-ZA" dirty="0"/>
-              <a:t>Add class diagram</a:t>
-            </a:r>
-          </a:p>
-        </p:txBody>
-      </p:sp>
-      <p:sp>
-        <p:nvSpPr>
-          <p:cNvPr id="5" name="Title 1">
-            <a:extLst>
-              <a:ext uri="{FF2B5EF4-FFF2-40B4-BE49-F238E27FC236}">
-                <a16:creationId xmlns:a16="http://schemas.microsoft.com/office/drawing/2014/main" id="{D9F50746-F2AF-BD80-7CF7-30795F60076B}"/>
-              </a:ext>
-            </a:extLst>
-          </p:cNvPr>
-          <p:cNvSpPr>
-            <a:spLocks noGrp="1"/>
-          </p:cNvSpPr>
-          <p:nvPr>
-            <p:ph type="title"/>
-          </p:nvPr>
-        </p:nvSpPr>
-        <p:spPr>
-          <a:xfrm>
-            <a:off x="838200" y="365125"/>
-            <a:ext cx="10515600" cy="1325563"/>
-          </a:xfrm>
-          <a:solidFill>
-            <a:schemeClr val="accent4">
-              <a:lumMod val="60000"/>
-              <a:lumOff val="40000"/>
-            </a:schemeClr>
-          </a:solidFill>
-        </p:spPr>
-        <p:txBody>
-          <a:bodyPr>
-            <a:noAutofit/>
-          </a:bodyPr>
-          <a:lstStyle/>
-          <a:p>
-            <a:pPr algn="ctr"/>
-            <a:r>
-              <a:rPr lang="en-ZA" sz="4800" i="0" u="none" strike="noStrike" dirty="0">
-                <a:solidFill>
-                  <a:schemeClr val="bg1"/>
-                </a:solidFill>
-                <a:effectLst/>
-                <a:latin typeface="ADLaM Display" panose="02010000000000000000" pitchFamily="2" charset="0"/>
-                <a:ea typeface="ADLaM Display" panose="02010000000000000000" pitchFamily="2" charset="0"/>
-                <a:cs typeface="ADLaM Display" panose="02010000000000000000" pitchFamily="2" charset="0"/>
-              </a:rPr>
-              <a:t>City Management: </a:t>
-            </a:r>
-            <a:endParaRPr lang="en-ZA" sz="4800" dirty="0">
-              <a:solidFill>
-                <a:schemeClr val="bg1"/>
-              </a:solidFill>
-              <a:latin typeface="ADLaM Display" panose="02010000000000000000" pitchFamily="2" charset="0"/>
-              <a:ea typeface="ADLaM Display" panose="02010000000000000000" pitchFamily="2" charset="0"/>
-              <a:cs typeface="ADLaM Display" panose="02010000000000000000" pitchFamily="2" charset="0"/>
-            </a:endParaRPr>
-          </a:p>
-        </p:txBody>
-      </p:sp>
-    </p:spTree>
-    <p:extLst>
-      <p:ext uri="{BB962C8B-B14F-4D97-AF65-F5344CB8AC3E}">
-        <p14:creationId xmlns:p14="http://schemas.microsoft.com/office/powerpoint/2010/main" val="1167940508"/>
-      </p:ext>
-    </p:extLst>
-  </p:cSld>
-  <p:clrMapOvr>
-    <a:masterClrMapping/>
-  </p:clrMapOvr>
-</p:sld>
-</file>
-
 <file path=ppt/slides/slide16.xml><?xml version="1.0" encoding="utf-8"?>
 <p:sld xmlns:a="http://schemas.openxmlformats.org/drawingml/2006/main" xmlns:r="http://schemas.openxmlformats.org/officeDocument/2006/relationships" xmlns:p="http://schemas.openxmlformats.org/presentationml/2006/main">
   <p:cSld>
@@ -4684,6 +4893,127 @@
       </p:grpSpPr>
       <p:sp>
         <p:nvSpPr>
+          <p:cNvPr id="4" name="Content Placeholder 2">
+            <a:extLst>
+              <a:ext uri="{FF2B5EF4-FFF2-40B4-BE49-F238E27FC236}">
+                <a16:creationId xmlns:a16="http://schemas.microsoft.com/office/drawing/2014/main" id="{7410690B-FD90-5B80-D552-6E8A2C6D5A6D}"/>
+              </a:ext>
+            </a:extLst>
+          </p:cNvPr>
+          <p:cNvSpPr>
+            <a:spLocks noGrp="1"/>
+          </p:cNvSpPr>
+          <p:nvPr>
+            <p:ph idx="1"/>
+          </p:nvPr>
+        </p:nvSpPr>
+        <p:spPr>
+          <a:xfrm>
+            <a:off x="838200" y="1825625"/>
+            <a:ext cx="10515600" cy="4351338"/>
+          </a:xfrm>
+        </p:spPr>
+        <p:txBody>
+          <a:bodyPr/>
+          <a:lstStyle/>
+          <a:p>
+            <a:r>
+              <a:rPr lang="en-ZA" dirty="0"/>
+              <a:t>Add class diagram</a:t>
+            </a:r>
+          </a:p>
+        </p:txBody>
+      </p:sp>
+      <p:sp>
+        <p:nvSpPr>
+          <p:cNvPr id="5" name="Title 1">
+            <a:extLst>
+              <a:ext uri="{FF2B5EF4-FFF2-40B4-BE49-F238E27FC236}">
+                <a16:creationId xmlns:a16="http://schemas.microsoft.com/office/drawing/2014/main" id="{D9F50746-F2AF-BD80-7CF7-30795F60076B}"/>
+              </a:ext>
+            </a:extLst>
+          </p:cNvPr>
+          <p:cNvSpPr>
+            <a:spLocks noGrp="1"/>
+          </p:cNvSpPr>
+          <p:nvPr>
+            <p:ph type="title"/>
+          </p:nvPr>
+        </p:nvSpPr>
+        <p:spPr>
+          <a:xfrm>
+            <a:off x="838200" y="365125"/>
+            <a:ext cx="10515600" cy="1325563"/>
+          </a:xfrm>
+          <a:solidFill>
+            <a:schemeClr val="accent4">
+              <a:lumMod val="60000"/>
+              <a:lumOff val="40000"/>
+            </a:schemeClr>
+          </a:solidFill>
+        </p:spPr>
+        <p:txBody>
+          <a:bodyPr>
+            <a:noAutofit/>
+          </a:bodyPr>
+          <a:lstStyle/>
+          <a:p>
+            <a:pPr algn="ctr"/>
+            <a:r>
+              <a:rPr lang="en-ZA" sz="4800" i="0" u="none" strike="noStrike" dirty="0">
+                <a:solidFill>
+                  <a:schemeClr val="bg1"/>
+                </a:solidFill>
+                <a:effectLst/>
+                <a:latin typeface="ADLaM Display" panose="02010000000000000000" pitchFamily="2" charset="0"/>
+                <a:ea typeface="ADLaM Display" panose="02010000000000000000" pitchFamily="2" charset="0"/>
+                <a:cs typeface="ADLaM Display" panose="02010000000000000000" pitchFamily="2" charset="0"/>
+              </a:rPr>
+              <a:t>City Management: </a:t>
+            </a:r>
+            <a:endParaRPr lang="en-ZA" sz="4800" dirty="0">
+              <a:solidFill>
+                <a:schemeClr val="bg1"/>
+              </a:solidFill>
+              <a:latin typeface="ADLaM Display" panose="02010000000000000000" pitchFamily="2" charset="0"/>
+              <a:ea typeface="ADLaM Display" panose="02010000000000000000" pitchFamily="2" charset="0"/>
+              <a:cs typeface="ADLaM Display" panose="02010000000000000000" pitchFamily="2" charset="0"/>
+            </a:endParaRPr>
+          </a:p>
+        </p:txBody>
+      </p:sp>
+    </p:spTree>
+    <p:extLst>
+      <p:ext uri="{BB962C8B-B14F-4D97-AF65-F5344CB8AC3E}">
+        <p14:creationId xmlns:p14="http://schemas.microsoft.com/office/powerpoint/2010/main" val="1167940508"/>
+      </p:ext>
+    </p:extLst>
+  </p:cSld>
+  <p:clrMapOvr>
+    <a:masterClrMapping/>
+  </p:clrMapOvr>
+</p:sld>
+</file>
+
+<file path=ppt/slides/slide17.xml><?xml version="1.0" encoding="utf-8"?>
+<p:sld xmlns:a="http://schemas.openxmlformats.org/drawingml/2006/main" xmlns:r="http://schemas.openxmlformats.org/officeDocument/2006/relationships" xmlns:p="http://schemas.openxmlformats.org/presentationml/2006/main">
+  <p:cSld>
+    <p:spTree>
+      <p:nvGrpSpPr>
+        <p:cNvPr id="1" name=""/>
+        <p:cNvGrpSpPr/>
+        <p:nvPr/>
+      </p:nvGrpSpPr>
+      <p:grpSpPr>
+        <a:xfrm>
+          <a:off x="0" y="0"/>
+          <a:ext cx="0" cy="0"/>
+          <a:chOff x="0" y="0"/>
+          <a:chExt cx="0" cy="0"/>
+        </a:xfrm>
+      </p:grpSpPr>
+      <p:sp>
+        <p:nvSpPr>
           <p:cNvPr id="3" name="Content Placeholder 2">
             <a:extLst>
               <a:ext uri="{FF2B5EF4-FFF2-40B4-BE49-F238E27FC236}">
@@ -4821,7 +5151,7 @@
 </p:sld>
 </file>
 
-<file path=ppt/slides/slide17.xml><?xml version="1.0" encoding="utf-8"?>
+<file path=ppt/slides/slide18.xml><?xml version="1.0" encoding="utf-8"?>
 <p:sld xmlns:a="http://schemas.openxmlformats.org/drawingml/2006/main" xmlns:r="http://schemas.openxmlformats.org/officeDocument/2006/relationships" xmlns:p="http://schemas.openxmlformats.org/presentationml/2006/main">
   <p:cSld>
     <p:bg>
@@ -4841,7 +5171,13 @@
     </p:bg>
     <p:spTree>
       <p:nvGrpSpPr>
-        <p:cNvPr id="1" name=""/>
+        <p:cNvPr id="1" name="">
+          <a:extLst>
+            <a:ext uri="{FF2B5EF4-FFF2-40B4-BE49-F238E27FC236}">
+              <a16:creationId xmlns:a16="http://schemas.microsoft.com/office/drawing/2014/main" id="{2F307CD5-47FE-E8C6-9C44-9D9043D45BBA}"/>
+            </a:ext>
+          </a:extLst>
+        </p:cNvPr>
         <p:cNvGrpSpPr/>
         <p:nvPr/>
       </p:nvGrpSpPr>
@@ -4858,7 +5194,7 @@
           <p:cNvPr id="3" name="Content Placeholder 2">
             <a:extLst>
               <a:ext uri="{FF2B5EF4-FFF2-40B4-BE49-F238E27FC236}">
-                <a16:creationId xmlns:a16="http://schemas.microsoft.com/office/drawing/2014/main" id="{7E06C89F-6E2E-32A8-7E22-0882891FAC23}"/>
+                <a16:creationId xmlns:a16="http://schemas.microsoft.com/office/drawing/2014/main" id="{EA1127C7-2E16-2B25-3D17-C01B5CA4F09C}"/>
               </a:ext>
             </a:extLst>
           </p:cNvPr>
@@ -4868,196 +5204,404 @@
           <p:nvPr>
             <p:ph idx="1"/>
           </p:nvPr>
-        </p:nvSpPr>
-        <p:spPr/>
-        <p:txBody>
-          <a:bodyPr/>
-          <a:lstStyle/>
-          <a:p>
-            <a:pPr marL="0" indent="0" algn="ctr">
-              <a:buNone/>
-            </a:pPr>
-            <a:r>
-              <a:rPr lang="en-ZA" dirty="0">
-                <a:latin typeface="ADLaM Display" panose="02010000000000000000" pitchFamily="2" charset="0"/>
-                <a:ea typeface="ADLaM Display" panose="02010000000000000000" pitchFamily="2" charset="0"/>
-                <a:cs typeface="ADLaM Display" panose="02010000000000000000" pitchFamily="2" charset="0"/>
-              </a:rPr>
-              <a:t>Explain resources</a:t>
-            </a:r>
-          </a:p>
-        </p:txBody>
-      </p:sp>
-      <p:sp>
-        <p:nvSpPr>
-          <p:cNvPr id="5" name="Title 4">
-            <a:extLst>
-              <a:ext uri="{FF2B5EF4-FFF2-40B4-BE49-F238E27FC236}">
-                <a16:creationId xmlns:a16="http://schemas.microsoft.com/office/drawing/2014/main" id="{C1C0A778-9A3B-E6D2-D322-F8954379D157}"/>
-              </a:ext>
-            </a:extLst>
-          </p:cNvPr>
-          <p:cNvSpPr>
-            <a:spLocks noGrp="1"/>
-          </p:cNvSpPr>
-          <p:nvPr>
-            <p:ph type="title"/>
-          </p:nvPr>
-        </p:nvSpPr>
-        <p:spPr/>
-        <p:txBody>
-          <a:bodyPr/>
-          <a:lstStyle/>
-          <a:p>
-            <a:endParaRPr lang="en-ZA"/>
-          </a:p>
-        </p:txBody>
-      </p:sp>
-      <p:sp>
-        <p:nvSpPr>
-          <p:cNvPr id="6" name="Title 1">
-            <a:extLst>
-              <a:ext uri="{FF2B5EF4-FFF2-40B4-BE49-F238E27FC236}">
-                <a16:creationId xmlns:a16="http://schemas.microsoft.com/office/drawing/2014/main" id="{92228DDE-933E-BD63-3767-898AC54107EB}"/>
-              </a:ext>
-            </a:extLst>
-          </p:cNvPr>
-          <p:cNvSpPr txBox="1">
-            <a:spLocks/>
-          </p:cNvSpPr>
-          <p:nvPr/>
         </p:nvSpPr>
         <p:spPr>
           <a:xfrm>
-            <a:off x="838200" y="365124"/>
-            <a:ext cx="10515600" cy="1325563"/>
+            <a:off x="838199" y="1825625"/>
+            <a:ext cx="10614891" cy="4316557"/>
           </a:xfrm>
-          <a:prstGeom prst="rect">
-            <a:avLst/>
-          </a:prstGeom>
-          <a:solidFill>
-            <a:schemeClr val="accent4">
-              <a:lumMod val="60000"/>
-              <a:lumOff val="40000"/>
-            </a:schemeClr>
-          </a:solidFill>
         </p:spPr>
         <p:txBody>
-          <a:bodyPr vert="horz" lIns="91440" tIns="45720" rIns="91440" bIns="45720" rtlCol="0" anchor="ctr">
-            <a:noAutofit/>
+          <a:bodyPr>
+            <a:normAutofit fontScale="92500" lnSpcReduction="10000"/>
           </a:bodyPr>
-          <a:lstStyle>
-            <a:lvl1pPr algn="l" defTabSz="914400" rtl="0" eaLnBrk="1" latinLnBrk="0" hangingPunct="1">
+          <a:lstStyle/>
+          <a:p>
+            <a:pPr marL="0" marR="0" lvl="0" indent="0" algn="ctr">
               <a:lnSpc>
-                <a:spcPct val="90000"/>
+                <a:spcPct val="107000"/>
               </a:lnSpc>
               <a:spcBef>
-                <a:spcPct val="0"/>
+                <a:spcPts val="0"/>
               </a:spcBef>
-              <a:buNone/>
-              <a:defRPr sz="4400" kern="1200">
-                <a:solidFill>
-                  <a:schemeClr val="tx1"/>
-                </a:solidFill>
-                <a:latin typeface="+mj-lt"/>
-                <a:ea typeface="+mj-ea"/>
-                <a:cs typeface="+mj-cs"/>
-              </a:defRPr>
-            </a:lvl1pPr>
-          </a:lstStyle>
-          <a:p>
-            <a:pPr algn="ctr"/>
-            <a:r>
-              <a:rPr lang="en-ZA" sz="4800">
-                <a:solidFill>
-                  <a:schemeClr val="bg1"/>
-                </a:solidFill>
-                <a:latin typeface="ADLaM Display" panose="02010000000000000000" pitchFamily="2" charset="0"/>
-                <a:ea typeface="ADLaM Display" panose="02010000000000000000" pitchFamily="2" charset="0"/>
-                <a:cs typeface="ADLaM Display" panose="02010000000000000000" pitchFamily="2" charset="0"/>
-              </a:rPr>
-              <a:t>Resources: </a:t>
-            </a:r>
-            <a:endParaRPr lang="en-ZA" sz="4800" dirty="0">
-              <a:solidFill>
-                <a:schemeClr val="bg1"/>
-              </a:solidFill>
+              <a:spcAft>
+                <a:spcPts val="0"/>
+              </a:spcAft>
+              <a:buNone/>
+            </a:pPr>
+            <a:r>
+              <a:rPr lang="en-ZA" sz="3200" u="sng" kern="100" dirty="0">
+                <a:effectLst/>
+                <a:latin typeface="ADLaM Display" panose="02010000000000000000" pitchFamily="2" charset="0"/>
+                <a:ea typeface="ADLaM Display" panose="02010000000000000000" pitchFamily="2" charset="0"/>
+                <a:cs typeface="ADLaM Display" panose="02010000000000000000" pitchFamily="2" charset="0"/>
+              </a:rPr>
+              <a:t>Resources</a:t>
+            </a:r>
+          </a:p>
+          <a:p>
+            <a:pPr marL="0" marR="0" lvl="0" indent="0" algn="ctr">
+              <a:lnSpc>
+                <a:spcPct val="107000"/>
+              </a:lnSpc>
+              <a:spcBef>
+                <a:spcPts val="0"/>
+              </a:spcBef>
+              <a:spcAft>
+                <a:spcPts val="0"/>
+              </a:spcAft>
+              <a:buNone/>
+            </a:pPr>
+            <a:endParaRPr lang="en-ZA" sz="2400" kern="100" dirty="0">
+              <a:effectLst/>
               <a:latin typeface="ADLaM Display" panose="02010000000000000000" pitchFamily="2" charset="0"/>
               <a:ea typeface="ADLaM Display" panose="02010000000000000000" pitchFamily="2" charset="0"/>
               <a:cs typeface="ADLaM Display" panose="02010000000000000000" pitchFamily="2" charset="0"/>
             </a:endParaRPr>
           </a:p>
-        </p:txBody>
-      </p:sp>
-    </p:spTree>
-    <p:extLst>
-      <p:ext uri="{BB962C8B-B14F-4D97-AF65-F5344CB8AC3E}">
-        <p14:creationId xmlns:p14="http://schemas.microsoft.com/office/powerpoint/2010/main" val="2114280471"/>
-      </p:ext>
-    </p:extLst>
-  </p:cSld>
-  <p:clrMapOvr>
-    <a:masterClrMapping/>
-  </p:clrMapOvr>
-</p:sld>
-</file>
-
-<file path=ppt/slides/slide18.xml><?xml version="1.0" encoding="utf-8"?>
-<p:sld xmlns:a="http://schemas.openxmlformats.org/drawingml/2006/main" xmlns:r="http://schemas.openxmlformats.org/officeDocument/2006/relationships" xmlns:p="http://schemas.openxmlformats.org/presentationml/2006/main">
-  <p:cSld>
-    <p:spTree>
-      <p:nvGrpSpPr>
-        <p:cNvPr id="1" name=""/>
-        <p:cNvGrpSpPr/>
-        <p:nvPr/>
-      </p:nvGrpSpPr>
-      <p:grpSpPr>
-        <a:xfrm>
-          <a:off x="0" y="0"/>
-          <a:ext cx="0" cy="0"/>
-          <a:chOff x="0" y="0"/>
-          <a:chExt cx="0" cy="0"/>
-        </a:xfrm>
-      </p:grpSpPr>
-      <p:sp>
-        <p:nvSpPr>
-          <p:cNvPr id="4" name="Content Placeholder 2">
-            <a:extLst>
-              <a:ext uri="{FF2B5EF4-FFF2-40B4-BE49-F238E27FC236}">
-                <a16:creationId xmlns:a16="http://schemas.microsoft.com/office/drawing/2014/main" id="{7410690B-FD90-5B80-D552-6E8A2C6D5A6D}"/>
-              </a:ext>
-            </a:extLst>
-          </p:cNvPr>
-          <p:cNvSpPr>
-            <a:spLocks noGrp="1"/>
-          </p:cNvSpPr>
-          <p:nvPr>
-            <p:ph idx="1"/>
-          </p:nvPr>
-        </p:nvSpPr>
-        <p:spPr>
-          <a:xfrm>
-            <a:off x="838200" y="1825625"/>
-            <a:ext cx="10515600" cy="4351338"/>
-          </a:xfrm>
-        </p:spPr>
-        <p:txBody>
-          <a:bodyPr/>
-          <a:lstStyle/>
-          <a:p>
-            <a:r>
-              <a:rPr lang="en-ZA" dirty="0"/>
-              <a:t>Add class diagram</a:t>
-            </a:r>
-          </a:p>
-        </p:txBody>
-      </p:sp>
-      <p:sp>
-        <p:nvSpPr>
-          <p:cNvPr id="5" name="Title 1">
-            <a:extLst>
-              <a:ext uri="{FF2B5EF4-FFF2-40B4-BE49-F238E27FC236}">
-                <a16:creationId xmlns:a16="http://schemas.microsoft.com/office/drawing/2014/main" id="{D9F50746-F2AF-BD80-7CF7-30795F60076B}"/>
+          <a:p>
+            <a:pPr marL="342900" marR="0" lvl="0" indent="-342900">
+              <a:lnSpc>
+                <a:spcPct val="107000"/>
+              </a:lnSpc>
+              <a:spcBef>
+                <a:spcPts val="0"/>
+              </a:spcBef>
+              <a:spcAft>
+                <a:spcPts val="0"/>
+              </a:spcAft>
+              <a:buFont typeface="Courier New" panose="02070309020205020404" pitchFamily="49" charset="0"/>
+              <a:buChar char="o"/>
+            </a:pPr>
+            <a:r>
+              <a:rPr lang="en-ZA" kern="100" dirty="0">
+                <a:latin typeface="ADLaM Display" panose="02010000000000000000" pitchFamily="2" charset="0"/>
+                <a:ea typeface="ADLaM Display" panose="02010000000000000000" pitchFamily="2" charset="0"/>
+                <a:cs typeface="ADLaM Display" panose="02010000000000000000" pitchFamily="2" charset="0"/>
+              </a:rPr>
+              <a:t>Materials </a:t>
+            </a:r>
+            <a:r>
+              <a:rPr lang="en-ZA" kern="100" dirty="0">
+                <a:effectLst/>
+                <a:latin typeface="ADLaM Display" panose="02010000000000000000" pitchFamily="2" charset="0"/>
+                <a:ea typeface="ADLaM Display" panose="02010000000000000000" pitchFamily="2" charset="0"/>
+                <a:cs typeface="ADLaM Display" panose="02010000000000000000" pitchFamily="2" charset="0"/>
+              </a:rPr>
+              <a:t>: Abstract class for managing different resources.</a:t>
+            </a:r>
+            <a:endParaRPr lang="en-ZA" sz="2000" kern="100" dirty="0">
+              <a:effectLst/>
+              <a:latin typeface="ADLaM Display" panose="02010000000000000000" pitchFamily="2" charset="0"/>
+              <a:ea typeface="ADLaM Display" panose="02010000000000000000" pitchFamily="2" charset="0"/>
+              <a:cs typeface="ADLaM Display" panose="02010000000000000000" pitchFamily="2" charset="0"/>
+            </a:endParaRPr>
+          </a:p>
+          <a:p>
+            <a:pPr marL="1200150" lvl="2" indent="-285750">
+              <a:lnSpc>
+                <a:spcPct val="107000"/>
+              </a:lnSpc>
+              <a:spcBef>
+                <a:spcPts val="0"/>
+              </a:spcBef>
+              <a:buFont typeface="Symbol" panose="05050102010706020507" pitchFamily="18" charset="2"/>
+              <a:buChar char=""/>
+            </a:pPr>
+            <a:r>
+              <a:rPr lang="en-ZA" sz="2400" kern="100" dirty="0">
+                <a:effectLst/>
+                <a:latin typeface="ADLaM Display" panose="02010000000000000000" pitchFamily="2" charset="0"/>
+                <a:ea typeface="ADLaM Display" panose="02010000000000000000" pitchFamily="2" charset="0"/>
+                <a:cs typeface="ADLaM Display" panose="02010000000000000000" pitchFamily="2" charset="0"/>
+              </a:rPr>
+              <a:t>Concrete: obtain and refine concrete</a:t>
+            </a:r>
+          </a:p>
+          <a:p>
+            <a:pPr marL="1200150" lvl="2" indent="-285750">
+              <a:lnSpc>
+                <a:spcPct val="107000"/>
+              </a:lnSpc>
+              <a:spcBef>
+                <a:spcPts val="0"/>
+              </a:spcBef>
+              <a:buFont typeface="Symbol" panose="05050102010706020507" pitchFamily="18" charset="2"/>
+              <a:buChar char=""/>
+            </a:pPr>
+            <a:r>
+              <a:rPr lang="en-ZA" sz="2400" kern="100" dirty="0">
+                <a:latin typeface="ADLaM Display" panose="02010000000000000000" pitchFamily="2" charset="0"/>
+                <a:ea typeface="ADLaM Display" panose="02010000000000000000" pitchFamily="2" charset="0"/>
+                <a:cs typeface="ADLaM Display" panose="02010000000000000000" pitchFamily="2" charset="0"/>
+              </a:rPr>
+              <a:t>Steel: </a:t>
+            </a:r>
+            <a:r>
+              <a:rPr lang="en-ZA" sz="2400" kern="100" dirty="0">
+                <a:effectLst/>
+                <a:latin typeface="ADLaM Display" panose="02010000000000000000" pitchFamily="2" charset="0"/>
+                <a:ea typeface="ADLaM Display" panose="02010000000000000000" pitchFamily="2" charset="0"/>
+                <a:cs typeface="ADLaM Display" panose="02010000000000000000" pitchFamily="2" charset="0"/>
+              </a:rPr>
+              <a:t>obtain and refine s</a:t>
+            </a:r>
+            <a:r>
+              <a:rPr lang="en-ZA" sz="2400" kern="100" dirty="0">
+                <a:latin typeface="ADLaM Display" panose="02010000000000000000" pitchFamily="2" charset="0"/>
+                <a:ea typeface="ADLaM Display" panose="02010000000000000000" pitchFamily="2" charset="0"/>
+                <a:cs typeface="ADLaM Display" panose="02010000000000000000" pitchFamily="2" charset="0"/>
+              </a:rPr>
+              <a:t>teel</a:t>
+            </a:r>
+          </a:p>
+          <a:p>
+            <a:pPr marL="1200150" lvl="2" indent="-285750">
+              <a:lnSpc>
+                <a:spcPct val="107000"/>
+              </a:lnSpc>
+              <a:spcBef>
+                <a:spcPts val="0"/>
+              </a:spcBef>
+              <a:buFont typeface="Symbol" panose="05050102010706020507" pitchFamily="18" charset="2"/>
+              <a:buChar char=""/>
+            </a:pPr>
+            <a:r>
+              <a:rPr lang="en-ZA" sz="2400" kern="100" dirty="0">
+                <a:latin typeface="ADLaM Display" panose="02010000000000000000" pitchFamily="2" charset="0"/>
+                <a:ea typeface="ADLaM Display" panose="02010000000000000000" pitchFamily="2" charset="0"/>
+                <a:cs typeface="ADLaM Display" panose="02010000000000000000" pitchFamily="2" charset="0"/>
+              </a:rPr>
+              <a:t>Wood: </a:t>
+            </a:r>
+            <a:r>
+              <a:rPr lang="en-ZA" sz="2400" kern="100" dirty="0">
+                <a:effectLst/>
+                <a:latin typeface="ADLaM Display" panose="02010000000000000000" pitchFamily="2" charset="0"/>
+                <a:ea typeface="ADLaM Display" panose="02010000000000000000" pitchFamily="2" charset="0"/>
+                <a:cs typeface="ADLaM Display" panose="02010000000000000000" pitchFamily="2" charset="0"/>
+              </a:rPr>
+              <a:t>obtain and refine w</a:t>
+            </a:r>
+            <a:r>
+              <a:rPr lang="en-ZA" sz="2400" kern="100" dirty="0">
+                <a:latin typeface="ADLaM Display" panose="02010000000000000000" pitchFamily="2" charset="0"/>
+                <a:ea typeface="ADLaM Display" panose="02010000000000000000" pitchFamily="2" charset="0"/>
+                <a:cs typeface="ADLaM Display" panose="02010000000000000000" pitchFamily="2" charset="0"/>
+              </a:rPr>
+              <a:t>ood</a:t>
+            </a:r>
+          </a:p>
+          <a:p>
+            <a:pPr marL="342900" marR="0" lvl="0" indent="-342900">
+              <a:lnSpc>
+                <a:spcPct val="107000"/>
+              </a:lnSpc>
+              <a:spcBef>
+                <a:spcPts val="0"/>
+              </a:spcBef>
+              <a:spcAft>
+                <a:spcPts val="0"/>
+              </a:spcAft>
+              <a:buFont typeface="Courier New" panose="02070309020205020404" pitchFamily="49" charset="0"/>
+              <a:buChar char="o"/>
+            </a:pPr>
+            <a:r>
+              <a:rPr lang="en-ZA" kern="100" dirty="0">
+                <a:effectLst/>
+                <a:latin typeface="ADLaM Display" panose="02010000000000000000" pitchFamily="2" charset="0"/>
+                <a:ea typeface="ADLaM Display" panose="02010000000000000000" pitchFamily="2" charset="0"/>
+                <a:cs typeface="ADLaM Display" panose="02010000000000000000" pitchFamily="2" charset="0"/>
+              </a:rPr>
+              <a:t>Energy : Manages different types of energy sources.</a:t>
+            </a:r>
+            <a:endParaRPr lang="en-ZA" sz="2000" kern="100" dirty="0">
+              <a:effectLst/>
+              <a:latin typeface="ADLaM Display" panose="02010000000000000000" pitchFamily="2" charset="0"/>
+              <a:ea typeface="ADLaM Display" panose="02010000000000000000" pitchFamily="2" charset="0"/>
+              <a:cs typeface="ADLaM Display" panose="02010000000000000000" pitchFamily="2" charset="0"/>
+            </a:endParaRPr>
+          </a:p>
+          <a:p>
+            <a:pPr marL="800100" lvl="1" indent="-342900">
+              <a:lnSpc>
+                <a:spcPct val="107000"/>
+              </a:lnSpc>
+              <a:spcBef>
+                <a:spcPts val="0"/>
+              </a:spcBef>
+              <a:buFont typeface="Symbol" panose="05050102010706020507" pitchFamily="18" charset="2"/>
+              <a:buChar char=""/>
+            </a:pPr>
+            <a:r>
+              <a:rPr lang="en-ZA" kern="100" dirty="0">
+                <a:effectLst/>
+                <a:latin typeface="ADLaM Display" panose="02010000000000000000" pitchFamily="2" charset="0"/>
+                <a:ea typeface="ADLaM Display" panose="02010000000000000000" pitchFamily="2" charset="0"/>
+                <a:cs typeface="ADLaM Display" panose="02010000000000000000" pitchFamily="2" charset="0"/>
+              </a:rPr>
+              <a:t>Coal, Hydro, Wind, Solar</a:t>
+            </a:r>
+            <a:endParaRPr lang="en-ZA" sz="1600" kern="100" dirty="0">
+              <a:effectLst/>
+              <a:latin typeface="ADLaM Display" panose="02010000000000000000" pitchFamily="2" charset="0"/>
+              <a:ea typeface="ADLaM Display" panose="02010000000000000000" pitchFamily="2" charset="0"/>
+              <a:cs typeface="ADLaM Display" panose="02010000000000000000" pitchFamily="2" charset="0"/>
+            </a:endParaRPr>
+          </a:p>
+          <a:p>
+            <a:pPr marL="342900" marR="0" lvl="0" indent="-342900">
+              <a:lnSpc>
+                <a:spcPct val="107000"/>
+              </a:lnSpc>
+              <a:spcBef>
+                <a:spcPts val="0"/>
+              </a:spcBef>
+              <a:spcAft>
+                <a:spcPts val="0"/>
+              </a:spcAft>
+              <a:buFont typeface="Courier New" panose="02070309020205020404" pitchFamily="49" charset="0"/>
+              <a:buChar char="o"/>
+            </a:pPr>
+            <a:r>
+              <a:rPr lang="en-ZA" kern="100" dirty="0">
+                <a:effectLst/>
+                <a:latin typeface="ADLaM Display" panose="02010000000000000000" pitchFamily="2" charset="0"/>
+                <a:ea typeface="ADLaM Display" panose="02010000000000000000" pitchFamily="2" charset="0"/>
+                <a:cs typeface="ADLaM Display" panose="02010000000000000000" pitchFamily="2" charset="0"/>
+              </a:rPr>
+              <a:t>Water : Manages the supply of water to the city.</a:t>
+            </a:r>
+            <a:endParaRPr lang="en-ZA" sz="2000" kern="100" dirty="0">
+              <a:effectLst/>
+              <a:latin typeface="ADLaM Display" panose="02010000000000000000" pitchFamily="2" charset="0"/>
+              <a:ea typeface="ADLaM Display" panose="02010000000000000000" pitchFamily="2" charset="0"/>
+              <a:cs typeface="ADLaM Display" panose="02010000000000000000" pitchFamily="2" charset="0"/>
+            </a:endParaRPr>
+          </a:p>
+          <a:p>
+            <a:pPr marL="342900" marR="0" lvl="0" indent="-342900">
+              <a:lnSpc>
+                <a:spcPct val="107000"/>
+              </a:lnSpc>
+              <a:spcBef>
+                <a:spcPts val="0"/>
+              </a:spcBef>
+              <a:spcAft>
+                <a:spcPts val="0"/>
+              </a:spcAft>
+              <a:buFont typeface="Courier New" panose="02070309020205020404" pitchFamily="49" charset="0"/>
+              <a:buChar char="o"/>
+            </a:pPr>
+            <a:r>
+              <a:rPr lang="en-ZA" kern="100" dirty="0">
+                <a:latin typeface="ADLaM Display" panose="02010000000000000000" pitchFamily="2" charset="0"/>
+                <a:ea typeface="ADLaM Display" panose="02010000000000000000" pitchFamily="2" charset="0"/>
+                <a:cs typeface="ADLaM Display" panose="02010000000000000000" pitchFamily="2" charset="0"/>
+              </a:rPr>
+              <a:t>Budget </a:t>
+            </a:r>
+            <a:r>
+              <a:rPr lang="en-ZA" kern="100" dirty="0">
+                <a:effectLst/>
+                <a:latin typeface="ADLaM Display" panose="02010000000000000000" pitchFamily="2" charset="0"/>
+                <a:ea typeface="ADLaM Display" panose="02010000000000000000" pitchFamily="2" charset="0"/>
+                <a:cs typeface="ADLaM Display" panose="02010000000000000000" pitchFamily="2" charset="0"/>
+              </a:rPr>
+              <a:t>: Manages the city’s financial resources.</a:t>
+            </a:r>
+            <a:endParaRPr lang="en-ZA" sz="2000" kern="100" dirty="0">
+              <a:effectLst/>
+              <a:latin typeface="ADLaM Display" panose="02010000000000000000" pitchFamily="2" charset="0"/>
+              <a:ea typeface="ADLaM Display" panose="02010000000000000000" pitchFamily="2" charset="0"/>
+              <a:cs typeface="ADLaM Display" panose="02010000000000000000" pitchFamily="2" charset="0"/>
+            </a:endParaRPr>
+          </a:p>
+          <a:p>
+            <a:pPr marL="1200150" lvl="2" indent="-285750">
+              <a:lnSpc>
+                <a:spcPct val="107000"/>
+              </a:lnSpc>
+              <a:spcBef>
+                <a:spcPts val="0"/>
+              </a:spcBef>
+              <a:buFont typeface="Symbol" panose="05050102010706020507" pitchFamily="18" charset="2"/>
+              <a:buChar char=""/>
+            </a:pPr>
+            <a:r>
+              <a:rPr lang="en-ZA" sz="2400" kern="100" dirty="0">
+                <a:effectLst/>
+                <a:latin typeface="ADLaM Display" panose="02010000000000000000" pitchFamily="2" charset="0"/>
+                <a:ea typeface="ADLaM Display" panose="02010000000000000000" pitchFamily="2" charset="0"/>
+                <a:cs typeface="ADLaM Display" panose="02010000000000000000" pitchFamily="2" charset="0"/>
+              </a:rPr>
+              <a:t>Cash, Debt</a:t>
+            </a:r>
+            <a:endParaRPr lang="en-ZA" sz="2400" kern="100" dirty="0">
+              <a:latin typeface="ADLaM Display" panose="02010000000000000000" pitchFamily="2" charset="0"/>
+              <a:ea typeface="ADLaM Display" panose="02010000000000000000" pitchFamily="2" charset="0"/>
+              <a:cs typeface="ADLaM Display" panose="02010000000000000000" pitchFamily="2" charset="0"/>
+            </a:endParaRPr>
+          </a:p>
+          <a:p>
+            <a:pPr marL="1200150" lvl="2" indent="-285750">
+              <a:lnSpc>
+                <a:spcPct val="107000"/>
+              </a:lnSpc>
+              <a:spcBef>
+                <a:spcPts val="0"/>
+              </a:spcBef>
+              <a:buFont typeface="Symbol" panose="05050102010706020507" pitchFamily="18" charset="2"/>
+              <a:buChar char=""/>
+            </a:pPr>
+            <a:endParaRPr lang="en-ZA" sz="2400" kern="100" dirty="0">
+              <a:latin typeface="ADLaM Display" panose="02010000000000000000" pitchFamily="2" charset="0"/>
+              <a:ea typeface="ADLaM Display" panose="02010000000000000000" pitchFamily="2" charset="0"/>
+              <a:cs typeface="ADLaM Display" panose="02010000000000000000" pitchFamily="2" charset="0"/>
+            </a:endParaRPr>
+          </a:p>
+          <a:p>
+            <a:pPr marL="914400" lvl="2" indent="0">
+              <a:lnSpc>
+                <a:spcPct val="107000"/>
+              </a:lnSpc>
+              <a:spcBef>
+                <a:spcPts val="0"/>
+              </a:spcBef>
+              <a:buNone/>
+            </a:pPr>
+            <a:endParaRPr lang="en-ZA" sz="1600" kern="100" dirty="0">
+              <a:latin typeface="ADLaM Display" panose="02010000000000000000" pitchFamily="2" charset="0"/>
+              <a:ea typeface="ADLaM Display" panose="02010000000000000000" pitchFamily="2" charset="0"/>
+              <a:cs typeface="ADLaM Display" panose="02010000000000000000" pitchFamily="2" charset="0"/>
+            </a:endParaRPr>
+          </a:p>
+          <a:p>
+            <a:pPr marL="1200150" lvl="2" indent="-285750">
+              <a:lnSpc>
+                <a:spcPct val="107000"/>
+              </a:lnSpc>
+              <a:spcBef>
+                <a:spcPts val="0"/>
+              </a:spcBef>
+              <a:buFont typeface="Symbol" panose="05050102010706020507" pitchFamily="18" charset="2"/>
+              <a:buChar char=""/>
+            </a:pPr>
+            <a:endParaRPr lang="en-ZA" sz="1600" kern="100" dirty="0">
+              <a:effectLst/>
+              <a:latin typeface="ADLaM Display" panose="02010000000000000000" pitchFamily="2" charset="0"/>
+              <a:ea typeface="ADLaM Display" panose="02010000000000000000" pitchFamily="2" charset="0"/>
+              <a:cs typeface="ADLaM Display" panose="02010000000000000000" pitchFamily="2" charset="0"/>
+            </a:endParaRPr>
+          </a:p>
+        </p:txBody>
+      </p:sp>
+      <p:sp>
+        <p:nvSpPr>
+          <p:cNvPr id="4" name="Title 1">
+            <a:extLst>
+              <a:ext uri="{FF2B5EF4-FFF2-40B4-BE49-F238E27FC236}">
+                <a16:creationId xmlns:a16="http://schemas.microsoft.com/office/drawing/2014/main" id="{54749544-19A4-8A84-E03D-6CE2135F035A}"/>
               </a:ext>
             </a:extLst>
           </p:cNvPr>
@@ -5097,7 +5641,7 @@
                 <a:ea typeface="ADLaM Display" panose="02010000000000000000" pitchFamily="2" charset="0"/>
                 <a:cs typeface="ADLaM Display" panose="02010000000000000000" pitchFamily="2" charset="0"/>
               </a:rPr>
-              <a:t>Resources: </a:t>
+              <a:t>Resources</a:t>
             </a:r>
             <a:endParaRPr lang="en-ZA" sz="4800" dirty="0">
               <a:solidFill>
@@ -5113,7 +5657,7 @@
     </p:spTree>
     <p:extLst>
       <p:ext uri="{BB962C8B-B14F-4D97-AF65-F5344CB8AC3E}">
-        <p14:creationId xmlns:p14="http://schemas.microsoft.com/office/powerpoint/2010/main" val="2747766523"/>
+        <p14:creationId xmlns:p14="http://schemas.microsoft.com/office/powerpoint/2010/main" val="2224821450"/>
       </p:ext>
     </p:extLst>
   </p:cSld>
@@ -5142,10 +5686,10 @@
       </p:grpSpPr>
       <p:sp>
         <p:nvSpPr>
-          <p:cNvPr id="3" name="Content Placeholder 2">
-            <a:extLst>
-              <a:ext uri="{FF2B5EF4-FFF2-40B4-BE49-F238E27FC236}">
-                <a16:creationId xmlns:a16="http://schemas.microsoft.com/office/drawing/2014/main" id="{8474ED0A-B0FA-EE00-EEFD-4FEBC4A64FAF}"/>
+          <p:cNvPr id="4" name="Content Placeholder 2">
+            <a:extLst>
+              <a:ext uri="{FF2B5EF4-FFF2-40B4-BE49-F238E27FC236}">
+                <a16:creationId xmlns:a16="http://schemas.microsoft.com/office/drawing/2014/main" id="{7410690B-FD90-5B80-D552-6E8A2C6D5A6D}"/>
               </a:ext>
             </a:extLst>
           </p:cNvPr>
@@ -5156,27 +5700,29 @@
             <p:ph idx="1"/>
           </p:nvPr>
         </p:nvSpPr>
-        <p:spPr/>
+        <p:spPr>
+          <a:xfrm>
+            <a:off x="838200" y="1825625"/>
+            <a:ext cx="10515600" cy="4351338"/>
+          </a:xfrm>
+        </p:spPr>
         <p:txBody>
           <a:bodyPr/>
           <a:lstStyle/>
           <a:p>
             <a:r>
               <a:rPr lang="en-ZA" dirty="0"/>
-              <a:t>Explain pattern , attributes and methods</a:t>
-            </a:r>
-          </a:p>
-          <a:p>
-            <a:endParaRPr lang="en-ZA" dirty="0"/>
-          </a:p>
-        </p:txBody>
-      </p:sp>
-      <p:sp>
-        <p:nvSpPr>
-          <p:cNvPr id="5" name="Title 4">
-            <a:extLst>
-              <a:ext uri="{FF2B5EF4-FFF2-40B4-BE49-F238E27FC236}">
-                <a16:creationId xmlns:a16="http://schemas.microsoft.com/office/drawing/2014/main" id="{353E4FA2-25A0-C1AE-8EB6-351DB7B5ABB3}"/>
+              <a:t>Add class diagram</a:t>
+            </a:r>
+          </a:p>
+        </p:txBody>
+      </p:sp>
+      <p:sp>
+        <p:nvSpPr>
+          <p:cNvPr id="5" name="Title 1">
+            <a:extLst>
+              <a:ext uri="{FF2B5EF4-FFF2-40B4-BE49-F238E27FC236}">
+                <a16:creationId xmlns:a16="http://schemas.microsoft.com/office/drawing/2014/main" id="{D9F50746-F2AF-BD80-7CF7-30795F60076B}"/>
               </a:ext>
             </a:extLst>
           </p:cNvPr>
@@ -5186,38 +5732,12 @@
           <p:nvPr>
             <p:ph type="title"/>
           </p:nvPr>
-        </p:nvSpPr>
-        <p:spPr/>
-        <p:txBody>
-          <a:bodyPr/>
-          <a:lstStyle/>
-          <a:p>
-            <a:endParaRPr lang="en-ZA"/>
-          </a:p>
-        </p:txBody>
-      </p:sp>
-      <p:sp>
-        <p:nvSpPr>
-          <p:cNvPr id="6" name="Title 1">
-            <a:extLst>
-              <a:ext uri="{FF2B5EF4-FFF2-40B4-BE49-F238E27FC236}">
-                <a16:creationId xmlns:a16="http://schemas.microsoft.com/office/drawing/2014/main" id="{CD06E692-2AB9-9C8E-4119-0CF4481337D1}"/>
-              </a:ext>
-            </a:extLst>
-          </p:cNvPr>
-          <p:cNvSpPr txBox="1">
-            <a:spLocks/>
-          </p:cNvSpPr>
-          <p:nvPr/>
         </p:nvSpPr>
         <p:spPr>
           <a:xfrm>
             <a:off x="838200" y="365125"/>
             <a:ext cx="10515600" cy="1325563"/>
           </a:xfrm>
-          <a:prstGeom prst="rect">
-            <a:avLst/>
-          </a:prstGeom>
           <a:solidFill>
             <a:schemeClr val="accent4">
               <a:lumMod val="60000"/>
@@ -5226,35 +5746,18 @@
           </a:solidFill>
         </p:spPr>
         <p:txBody>
-          <a:bodyPr vert="horz" lIns="91440" tIns="45720" rIns="91440" bIns="45720" rtlCol="0" anchor="ctr">
+          <a:bodyPr>
             <a:noAutofit/>
           </a:bodyPr>
-          <a:lstStyle>
-            <a:lvl1pPr algn="l" defTabSz="914400" rtl="0" eaLnBrk="1" latinLnBrk="0" hangingPunct="1">
-              <a:lnSpc>
-                <a:spcPct val="90000"/>
-              </a:lnSpc>
-              <a:spcBef>
-                <a:spcPct val="0"/>
-              </a:spcBef>
-              <a:buNone/>
-              <a:defRPr sz="4400" kern="1200">
-                <a:solidFill>
-                  <a:schemeClr val="tx1"/>
-                </a:solidFill>
-                <a:latin typeface="+mj-lt"/>
-                <a:ea typeface="+mj-ea"/>
-                <a:cs typeface="+mj-cs"/>
-              </a:defRPr>
-            </a:lvl1pPr>
-          </a:lstStyle>
+          <a:lstStyle/>
           <a:p>
             <a:pPr algn="ctr"/>
             <a:r>
-              <a:rPr lang="en-ZA" sz="4800">
+              <a:rPr lang="en-ZA" sz="4800" i="0" u="none" strike="noStrike" dirty="0">
                 <a:solidFill>
                   <a:schemeClr val="bg1"/>
                 </a:solidFill>
+                <a:effectLst/>
                 <a:latin typeface="ADLaM Display" panose="02010000000000000000" pitchFamily="2" charset="0"/>
                 <a:ea typeface="ADLaM Display" panose="02010000000000000000" pitchFamily="2" charset="0"/>
                 <a:cs typeface="ADLaM Display" panose="02010000000000000000" pitchFamily="2" charset="0"/>
@@ -5275,7 +5778,7 @@
     </p:spTree>
     <p:extLst>
       <p:ext uri="{BB962C8B-B14F-4D97-AF65-F5344CB8AC3E}">
-        <p14:creationId xmlns:p14="http://schemas.microsoft.com/office/powerpoint/2010/main" val="1250620884"/>
+        <p14:creationId xmlns:p14="http://schemas.microsoft.com/office/powerpoint/2010/main" val="2747766523"/>
       </p:ext>
     </p:extLst>
   </p:cSld>
@@ -5654,6 +6157,530 @@
 <file path=ppt/slides/slide20.xml><?xml version="1.0" encoding="utf-8"?>
 <p:sld xmlns:a="http://schemas.openxmlformats.org/drawingml/2006/main" xmlns:r="http://schemas.openxmlformats.org/officeDocument/2006/relationships" xmlns:p="http://schemas.openxmlformats.org/presentationml/2006/main">
   <p:cSld>
+    <p:spTree>
+      <p:nvGrpSpPr>
+        <p:cNvPr id="1" name=""/>
+        <p:cNvGrpSpPr/>
+        <p:nvPr/>
+      </p:nvGrpSpPr>
+      <p:grpSpPr>
+        <a:xfrm>
+          <a:off x="0" y="0"/>
+          <a:ext cx="0" cy="0"/>
+          <a:chOff x="0" y="0"/>
+          <a:chExt cx="0" cy="0"/>
+        </a:xfrm>
+      </p:grpSpPr>
+      <p:sp>
+        <p:nvSpPr>
+          <p:cNvPr id="3" name="Content Placeholder 2">
+            <a:extLst>
+              <a:ext uri="{FF2B5EF4-FFF2-40B4-BE49-F238E27FC236}">
+                <a16:creationId xmlns:a16="http://schemas.microsoft.com/office/drawing/2014/main" id="{8474ED0A-B0FA-EE00-EEFD-4FEBC4A64FAF}"/>
+              </a:ext>
+            </a:extLst>
+          </p:cNvPr>
+          <p:cNvSpPr>
+            <a:spLocks noGrp="1"/>
+          </p:cNvSpPr>
+          <p:nvPr>
+            <p:ph idx="1"/>
+          </p:nvPr>
+        </p:nvSpPr>
+        <p:spPr/>
+        <p:txBody>
+          <a:bodyPr/>
+          <a:lstStyle/>
+          <a:p>
+            <a:r>
+              <a:rPr lang="en-ZA" dirty="0"/>
+              <a:t>All the resources implement the singleton design pattern. This ensures each resource has only one instance. A city can only have one of each resource.</a:t>
+            </a:r>
+          </a:p>
+          <a:p>
+            <a:r>
+              <a:rPr lang="en-ZA" dirty="0"/>
+              <a:t>Resources are used throughout the city to build, upgrade and maintain infrastructure.</a:t>
+            </a:r>
+          </a:p>
+          <a:p>
+            <a:r>
+              <a:rPr lang="en-ZA" dirty="0"/>
+              <a:t>The abstract Materials class and its respective base classes implement the template method. The increase() method in Materials calls the abstract functions obtain() and refine(), since different materials are increased differently.</a:t>
+            </a:r>
+          </a:p>
+          <a:p>
+            <a:endParaRPr lang="en-ZA" dirty="0"/>
+          </a:p>
+        </p:txBody>
+      </p:sp>
+      <p:sp>
+        <p:nvSpPr>
+          <p:cNvPr id="5" name="Title 4">
+            <a:extLst>
+              <a:ext uri="{FF2B5EF4-FFF2-40B4-BE49-F238E27FC236}">
+                <a16:creationId xmlns:a16="http://schemas.microsoft.com/office/drawing/2014/main" id="{353E4FA2-25A0-C1AE-8EB6-351DB7B5ABB3}"/>
+              </a:ext>
+            </a:extLst>
+          </p:cNvPr>
+          <p:cNvSpPr>
+            <a:spLocks noGrp="1"/>
+          </p:cNvSpPr>
+          <p:nvPr>
+            <p:ph type="title"/>
+          </p:nvPr>
+        </p:nvSpPr>
+        <p:spPr/>
+        <p:txBody>
+          <a:bodyPr/>
+          <a:lstStyle/>
+          <a:p>
+            <a:endParaRPr lang="en-ZA"/>
+          </a:p>
+        </p:txBody>
+      </p:sp>
+      <p:sp>
+        <p:nvSpPr>
+          <p:cNvPr id="6" name="Title 1">
+            <a:extLst>
+              <a:ext uri="{FF2B5EF4-FFF2-40B4-BE49-F238E27FC236}">
+                <a16:creationId xmlns:a16="http://schemas.microsoft.com/office/drawing/2014/main" id="{CD06E692-2AB9-9C8E-4119-0CF4481337D1}"/>
+              </a:ext>
+            </a:extLst>
+          </p:cNvPr>
+          <p:cNvSpPr txBox="1">
+            <a:spLocks/>
+          </p:cNvSpPr>
+          <p:nvPr/>
+        </p:nvSpPr>
+        <p:spPr>
+          <a:xfrm>
+            <a:off x="838200" y="365125"/>
+            <a:ext cx="10515600" cy="1325563"/>
+          </a:xfrm>
+          <a:prstGeom prst="rect">
+            <a:avLst/>
+          </a:prstGeom>
+          <a:solidFill>
+            <a:schemeClr val="accent4">
+              <a:lumMod val="60000"/>
+              <a:lumOff val="40000"/>
+            </a:schemeClr>
+          </a:solidFill>
+        </p:spPr>
+        <p:txBody>
+          <a:bodyPr vert="horz" lIns="91440" tIns="45720" rIns="91440" bIns="45720" rtlCol="0" anchor="ctr">
+            <a:noAutofit/>
+          </a:bodyPr>
+          <a:lstStyle>
+            <a:lvl1pPr algn="l" defTabSz="914400" rtl="0" eaLnBrk="1" latinLnBrk="0" hangingPunct="1">
+              <a:lnSpc>
+                <a:spcPct val="90000"/>
+              </a:lnSpc>
+              <a:spcBef>
+                <a:spcPct val="0"/>
+              </a:spcBef>
+              <a:buNone/>
+              <a:defRPr sz="4400" kern="1200">
+                <a:solidFill>
+                  <a:schemeClr val="tx1"/>
+                </a:solidFill>
+                <a:latin typeface="+mj-lt"/>
+                <a:ea typeface="+mj-ea"/>
+                <a:cs typeface="+mj-cs"/>
+              </a:defRPr>
+            </a:lvl1pPr>
+          </a:lstStyle>
+          <a:p>
+            <a:pPr algn="ctr"/>
+            <a:r>
+              <a:rPr lang="en-ZA" sz="4800">
+                <a:solidFill>
+                  <a:schemeClr val="bg1"/>
+                </a:solidFill>
+                <a:latin typeface="ADLaM Display" panose="02010000000000000000" pitchFamily="2" charset="0"/>
+                <a:ea typeface="ADLaM Display" panose="02010000000000000000" pitchFamily="2" charset="0"/>
+                <a:cs typeface="ADLaM Display" panose="02010000000000000000" pitchFamily="2" charset="0"/>
+              </a:rPr>
+              <a:t>Resources: </a:t>
+            </a:r>
+            <a:endParaRPr lang="en-ZA" sz="4800" dirty="0">
+              <a:solidFill>
+                <a:schemeClr val="bg1"/>
+              </a:solidFill>
+              <a:latin typeface="ADLaM Display" panose="02010000000000000000" pitchFamily="2" charset="0"/>
+              <a:ea typeface="ADLaM Display" panose="02010000000000000000" pitchFamily="2" charset="0"/>
+              <a:cs typeface="ADLaM Display" panose="02010000000000000000" pitchFamily="2" charset="0"/>
+            </a:endParaRPr>
+          </a:p>
+        </p:txBody>
+      </p:sp>
+    </p:spTree>
+    <p:extLst>
+      <p:ext uri="{BB962C8B-B14F-4D97-AF65-F5344CB8AC3E}">
+        <p14:creationId xmlns:p14="http://schemas.microsoft.com/office/powerpoint/2010/main" val="1250620884"/>
+      </p:ext>
+    </p:extLst>
+  </p:cSld>
+  <p:clrMapOvr>
+    <a:masterClrMapping/>
+  </p:clrMapOvr>
+</p:sld>
+</file>
+
+<file path=ppt/slides/slide21.xml><?xml version="1.0" encoding="utf-8"?>
+<p:sld xmlns:a="http://schemas.openxmlformats.org/drawingml/2006/main" xmlns:r="http://schemas.openxmlformats.org/officeDocument/2006/relationships" xmlns:p="http://schemas.openxmlformats.org/presentationml/2006/main">
+  <p:cSld>
+    <p:bg>
+      <p:bgPr>
+        <a:blipFill dpi="0" rotWithShape="1">
+          <a:blip r:embed="rId2">
+            <a:alphaModFix amt="20000"/>
+            <a:lum/>
+          </a:blip>
+          <a:srcRect/>
+          <a:stretch>
+            <a:fillRect t="-9000" b="-9000"/>
+          </a:stretch>
+        </a:blipFill>
+        <a:effectLst/>
+      </p:bgPr>
+    </p:bg>
+    <p:spTree>
+      <p:nvGrpSpPr>
+        <p:cNvPr id="1" name="">
+          <a:extLst>
+            <a:ext uri="{FF2B5EF4-FFF2-40B4-BE49-F238E27FC236}">
+              <a16:creationId xmlns:a16="http://schemas.microsoft.com/office/drawing/2014/main" id="{DEC27F50-410D-115C-1761-D3CC43ACEEC8}"/>
+            </a:ext>
+          </a:extLst>
+        </p:cNvPr>
+        <p:cNvGrpSpPr/>
+        <p:nvPr/>
+      </p:nvGrpSpPr>
+      <p:grpSpPr>
+        <a:xfrm>
+          <a:off x="0" y="0"/>
+          <a:ext cx="0" cy="0"/>
+          <a:chOff x="0" y="0"/>
+          <a:chExt cx="0" cy="0"/>
+        </a:xfrm>
+      </p:grpSpPr>
+      <p:sp>
+        <p:nvSpPr>
+          <p:cNvPr id="3" name="Content Placeholder 2">
+            <a:extLst>
+              <a:ext uri="{FF2B5EF4-FFF2-40B4-BE49-F238E27FC236}">
+                <a16:creationId xmlns:a16="http://schemas.microsoft.com/office/drawing/2014/main" id="{35FC104A-642F-EAE9-3609-C074F1718249}"/>
+              </a:ext>
+            </a:extLst>
+          </p:cNvPr>
+          <p:cNvSpPr>
+            <a:spLocks noGrp="1"/>
+          </p:cNvSpPr>
+          <p:nvPr>
+            <p:ph idx="1"/>
+          </p:nvPr>
+        </p:nvSpPr>
+        <p:spPr>
+          <a:xfrm>
+            <a:off x="838199" y="1825625"/>
+            <a:ext cx="10614891" cy="4316557"/>
+          </a:xfrm>
+        </p:spPr>
+        <p:txBody>
+          <a:bodyPr>
+            <a:normAutofit/>
+          </a:bodyPr>
+          <a:lstStyle/>
+          <a:p>
+            <a:pPr marL="0" marR="0" lvl="0" indent="0" algn="ctr">
+              <a:lnSpc>
+                <a:spcPct val="107000"/>
+              </a:lnSpc>
+              <a:spcBef>
+                <a:spcPts val="0"/>
+              </a:spcBef>
+              <a:spcAft>
+                <a:spcPts val="0"/>
+              </a:spcAft>
+              <a:buNone/>
+            </a:pPr>
+            <a:r>
+              <a:rPr lang="en-ZA" sz="3200" u="sng" kern="100" dirty="0">
+                <a:effectLst/>
+                <a:latin typeface="ADLaM Display" panose="02010000000000000000" pitchFamily="2" charset="0"/>
+                <a:ea typeface="ADLaM Display" panose="02010000000000000000" pitchFamily="2" charset="0"/>
+                <a:cs typeface="ADLaM Display" panose="02010000000000000000" pitchFamily="2" charset="0"/>
+              </a:rPr>
+              <a:t>Design patterns</a:t>
+            </a:r>
+          </a:p>
+          <a:p>
+            <a:pPr marL="0" marR="0" lvl="0" indent="0" algn="ctr">
+              <a:lnSpc>
+                <a:spcPct val="107000"/>
+              </a:lnSpc>
+              <a:spcBef>
+                <a:spcPts val="0"/>
+              </a:spcBef>
+              <a:spcAft>
+                <a:spcPts val="0"/>
+              </a:spcAft>
+              <a:buNone/>
+            </a:pPr>
+            <a:endParaRPr lang="en-ZA" sz="2400" kern="100" dirty="0">
+              <a:effectLst/>
+              <a:latin typeface="ADLaM Display" panose="02010000000000000000" pitchFamily="2" charset="0"/>
+              <a:ea typeface="ADLaM Display" panose="02010000000000000000" pitchFamily="2" charset="0"/>
+              <a:cs typeface="ADLaM Display" panose="02010000000000000000" pitchFamily="2" charset="0"/>
+            </a:endParaRPr>
+          </a:p>
+          <a:p>
+            <a:pPr marL="342900" marR="0" lvl="0" indent="-342900">
+              <a:lnSpc>
+                <a:spcPct val="107000"/>
+              </a:lnSpc>
+              <a:spcBef>
+                <a:spcPts val="0"/>
+              </a:spcBef>
+              <a:spcAft>
+                <a:spcPts val="0"/>
+              </a:spcAft>
+              <a:buFont typeface="Courier New" panose="02070309020205020404" pitchFamily="49" charset="0"/>
+              <a:buChar char="o"/>
+            </a:pPr>
+            <a:r>
+              <a:rPr lang="en-ZA" sz="3000" dirty="0"/>
+              <a:t>Singleton :</a:t>
+            </a:r>
+          </a:p>
+          <a:p>
+            <a:pPr marL="1200150" lvl="2" indent="-285750">
+              <a:lnSpc>
+                <a:spcPct val="107000"/>
+              </a:lnSpc>
+              <a:spcBef>
+                <a:spcPts val="0"/>
+              </a:spcBef>
+              <a:buFont typeface="Symbol" panose="05050102010706020507" pitchFamily="18" charset="2"/>
+              <a:buChar char=""/>
+            </a:pPr>
+            <a:r>
+              <a:rPr lang="en-ZA" sz="3000" dirty="0"/>
+              <a:t>Singletons: Energy, Budget, Water, Steel, Wood, Concrete</a:t>
+            </a:r>
+          </a:p>
+          <a:p>
+            <a:pPr marL="1200150" lvl="2" indent="-285750">
+              <a:lnSpc>
+                <a:spcPct val="107000"/>
+              </a:lnSpc>
+              <a:spcBef>
+                <a:spcPts val="0"/>
+              </a:spcBef>
+              <a:buFont typeface="Symbol" panose="05050102010706020507" pitchFamily="18" charset="2"/>
+              <a:buChar char=""/>
+            </a:pPr>
+            <a:r>
+              <a:rPr lang="en-ZA" sz="3000" dirty="0"/>
+              <a:t>::</a:t>
+            </a:r>
+            <a:r>
+              <a:rPr lang="en-ZA" sz="3000" dirty="0" err="1"/>
+              <a:t>getInstance</a:t>
+            </a:r>
+            <a:r>
+              <a:rPr lang="en-ZA" sz="3000" dirty="0"/>
+              <a:t>() returns the instance of the singleton</a:t>
+            </a:r>
+          </a:p>
+          <a:p>
+            <a:pPr marL="342900" marR="0" lvl="0" indent="-342900">
+              <a:lnSpc>
+                <a:spcPct val="107000"/>
+              </a:lnSpc>
+              <a:spcBef>
+                <a:spcPts val="0"/>
+              </a:spcBef>
+              <a:spcAft>
+                <a:spcPts val="0"/>
+              </a:spcAft>
+              <a:buFont typeface="Courier New" panose="02070309020205020404" pitchFamily="49" charset="0"/>
+              <a:buChar char="o"/>
+            </a:pPr>
+            <a:r>
+              <a:rPr lang="en-ZA" sz="3000" dirty="0"/>
+              <a:t>Template Method:</a:t>
+            </a:r>
+          </a:p>
+          <a:p>
+            <a:pPr marL="800100" lvl="1" indent="-342900">
+              <a:lnSpc>
+                <a:spcPct val="107000"/>
+              </a:lnSpc>
+              <a:spcBef>
+                <a:spcPts val="0"/>
+              </a:spcBef>
+              <a:buFont typeface="Symbol" panose="05050102010706020507" pitchFamily="18" charset="2"/>
+              <a:buChar char=""/>
+            </a:pPr>
+            <a:r>
+              <a:rPr lang="en-ZA" sz="3000" dirty="0" err="1"/>
+              <a:t>AbstractClass</a:t>
+            </a:r>
+            <a:r>
+              <a:rPr lang="en-ZA" sz="3000" dirty="0"/>
+              <a:t>: Material</a:t>
+            </a:r>
+          </a:p>
+          <a:p>
+            <a:pPr marL="800100" lvl="1" indent="-342900">
+              <a:lnSpc>
+                <a:spcPct val="107000"/>
+              </a:lnSpc>
+              <a:spcBef>
+                <a:spcPts val="0"/>
+              </a:spcBef>
+              <a:buFont typeface="Symbol" panose="05050102010706020507" pitchFamily="18" charset="2"/>
+              <a:buChar char=""/>
+            </a:pPr>
+            <a:r>
+              <a:rPr lang="en-ZA" sz="3000" dirty="0" err="1"/>
+              <a:t>ConcreteClasses</a:t>
+            </a:r>
+            <a:r>
+              <a:rPr lang="en-ZA" sz="3000" dirty="0"/>
+              <a:t>: Wood, Steel, Concrete</a:t>
+            </a:r>
+          </a:p>
+          <a:p>
+            <a:pPr marL="1200150" lvl="2" indent="-285750">
+              <a:lnSpc>
+                <a:spcPct val="107000"/>
+              </a:lnSpc>
+              <a:spcBef>
+                <a:spcPts val="0"/>
+              </a:spcBef>
+              <a:buFont typeface="Symbol" panose="05050102010706020507" pitchFamily="18" charset="2"/>
+              <a:buChar char=""/>
+            </a:pPr>
+            <a:endParaRPr lang="en-ZA" sz="2400" kern="100" dirty="0">
+              <a:latin typeface="ADLaM Display" panose="02010000000000000000" pitchFamily="2" charset="0"/>
+              <a:ea typeface="ADLaM Display" panose="02010000000000000000" pitchFamily="2" charset="0"/>
+              <a:cs typeface="ADLaM Display" panose="02010000000000000000" pitchFamily="2" charset="0"/>
+            </a:endParaRPr>
+          </a:p>
+          <a:p>
+            <a:pPr marL="914400" lvl="2" indent="0">
+              <a:lnSpc>
+                <a:spcPct val="107000"/>
+              </a:lnSpc>
+              <a:spcBef>
+                <a:spcPts val="0"/>
+              </a:spcBef>
+              <a:buNone/>
+            </a:pPr>
+            <a:endParaRPr lang="en-ZA" sz="1600" kern="100" dirty="0">
+              <a:latin typeface="ADLaM Display" panose="02010000000000000000" pitchFamily="2" charset="0"/>
+              <a:ea typeface="ADLaM Display" panose="02010000000000000000" pitchFamily="2" charset="0"/>
+              <a:cs typeface="ADLaM Display" panose="02010000000000000000" pitchFamily="2" charset="0"/>
+            </a:endParaRPr>
+          </a:p>
+          <a:p>
+            <a:pPr marL="1200150" lvl="2" indent="-285750">
+              <a:lnSpc>
+                <a:spcPct val="107000"/>
+              </a:lnSpc>
+              <a:spcBef>
+                <a:spcPts val="0"/>
+              </a:spcBef>
+              <a:buFont typeface="Symbol" panose="05050102010706020507" pitchFamily="18" charset="2"/>
+              <a:buChar char=""/>
+            </a:pPr>
+            <a:endParaRPr lang="en-ZA" sz="1600" kern="100" dirty="0">
+              <a:effectLst/>
+              <a:latin typeface="ADLaM Display" panose="02010000000000000000" pitchFamily="2" charset="0"/>
+              <a:ea typeface="ADLaM Display" panose="02010000000000000000" pitchFamily="2" charset="0"/>
+              <a:cs typeface="ADLaM Display" panose="02010000000000000000" pitchFamily="2" charset="0"/>
+            </a:endParaRPr>
+          </a:p>
+        </p:txBody>
+      </p:sp>
+      <p:sp>
+        <p:nvSpPr>
+          <p:cNvPr id="4" name="Title 1">
+            <a:extLst>
+              <a:ext uri="{FF2B5EF4-FFF2-40B4-BE49-F238E27FC236}">
+                <a16:creationId xmlns:a16="http://schemas.microsoft.com/office/drawing/2014/main" id="{8B0F5543-F26A-006E-F0F7-6C4B430F3E3C}"/>
+              </a:ext>
+            </a:extLst>
+          </p:cNvPr>
+          <p:cNvSpPr>
+            <a:spLocks noGrp="1"/>
+          </p:cNvSpPr>
+          <p:nvPr>
+            <p:ph type="title"/>
+          </p:nvPr>
+        </p:nvSpPr>
+        <p:spPr>
+          <a:xfrm>
+            <a:off x="838200" y="365125"/>
+            <a:ext cx="10515600" cy="1325563"/>
+          </a:xfrm>
+          <a:solidFill>
+            <a:schemeClr val="accent4">
+              <a:lumMod val="60000"/>
+              <a:lumOff val="40000"/>
+            </a:schemeClr>
+          </a:solidFill>
+        </p:spPr>
+        <p:txBody>
+          <a:bodyPr>
+            <a:noAutofit/>
+          </a:bodyPr>
+          <a:lstStyle/>
+          <a:p>
+            <a:pPr algn="ctr"/>
+            <a:r>
+              <a:rPr lang="en-ZA" sz="4800" i="0" u="none" strike="noStrike" dirty="0">
+                <a:solidFill>
+                  <a:schemeClr val="bg1"/>
+                </a:solidFill>
+                <a:effectLst/>
+                <a:latin typeface="ADLaM Display" panose="02010000000000000000" pitchFamily="2" charset="0"/>
+                <a:ea typeface="ADLaM Display" panose="02010000000000000000" pitchFamily="2" charset="0"/>
+                <a:cs typeface="ADLaM Display" panose="02010000000000000000" pitchFamily="2" charset="0"/>
+              </a:rPr>
+              <a:t>Resources</a:t>
+            </a:r>
+            <a:endParaRPr lang="en-ZA" sz="4800" dirty="0">
+              <a:solidFill>
+                <a:schemeClr val="bg1"/>
+              </a:solidFill>
+              <a:latin typeface="ADLaM Display" panose="02010000000000000000" pitchFamily="2" charset="0"/>
+              <a:ea typeface="ADLaM Display" panose="02010000000000000000" pitchFamily="2" charset="0"/>
+              <a:cs typeface="ADLaM Display" panose="02010000000000000000" pitchFamily="2" charset="0"/>
+            </a:endParaRPr>
+          </a:p>
+        </p:txBody>
+      </p:sp>
+    </p:spTree>
+    <p:extLst>
+      <p:ext uri="{BB962C8B-B14F-4D97-AF65-F5344CB8AC3E}">
+        <p14:creationId xmlns:p14="http://schemas.microsoft.com/office/powerpoint/2010/main" val="466742148"/>
+      </p:ext>
+    </p:extLst>
+  </p:cSld>
+  <p:clrMapOvr>
+    <a:masterClrMapping/>
+  </p:clrMapOvr>
+</p:sld>
+</file>
+
+<file path=ppt/slides/slide22.xml><?xml version="1.0" encoding="utf-8"?>
+<p:sld xmlns:a="http://schemas.openxmlformats.org/drawingml/2006/main" xmlns:r="http://schemas.openxmlformats.org/officeDocument/2006/relationships" xmlns:p="http://schemas.openxmlformats.org/presentationml/2006/main">
+  <p:cSld>
     <p:bg>
       <p:bgPr>
         <a:blipFill dpi="0" rotWithShape="1">
@@ -6028,7 +7055,7 @@
 </p:sld>
 </file>
 
-<file path=ppt/slides/slide21.xml><?xml version="1.0" encoding="utf-8"?>
+<file path=ppt/slides/slide23.xml><?xml version="1.0" encoding="utf-8"?>
 <p:sld xmlns:a="http://schemas.openxmlformats.org/drawingml/2006/main" xmlns:r="http://schemas.openxmlformats.org/officeDocument/2006/relationships" xmlns:p="http://schemas.openxmlformats.org/presentationml/2006/main">
   <p:cSld>
     <p:spTree>
@@ -6184,7 +7211,7 @@
 </p:sld>
 </file>
 
-<file path=ppt/slides/slide22.xml><?xml version="1.0" encoding="utf-8"?>
+<file path=ppt/slides/slide24.xml><?xml version="1.0" encoding="utf-8"?>
 <p:sld xmlns:a="http://schemas.openxmlformats.org/drawingml/2006/main" xmlns:r="http://schemas.openxmlformats.org/officeDocument/2006/relationships" xmlns:p="http://schemas.openxmlformats.org/presentationml/2006/main">
   <p:cSld>
     <p:spTree>
@@ -6427,7 +7454,7 @@
 </p:sld>
 </file>
 
-<file path=ppt/slides/slide23.xml><?xml version="1.0" encoding="utf-8"?>
+<file path=ppt/slides/slide25.xml><?xml version="1.0" encoding="utf-8"?>
 <p:sld xmlns:a="http://schemas.openxmlformats.org/drawingml/2006/main" xmlns:r="http://schemas.openxmlformats.org/officeDocument/2006/relationships" xmlns:p="http://schemas.openxmlformats.org/presentationml/2006/main">
   <p:cSld>
     <p:bg>
@@ -6600,7 +7627,7 @@
 </p:sld>
 </file>
 
-<file path=ppt/slides/slide24.xml><?xml version="1.0" encoding="utf-8"?>
+<file path=ppt/slides/slide26.xml><?xml version="1.0" encoding="utf-8"?>
 <p:sld xmlns:a="http://schemas.openxmlformats.org/drawingml/2006/main" xmlns:r="http://schemas.openxmlformats.org/officeDocument/2006/relationships" xmlns:p="http://schemas.openxmlformats.org/presentationml/2006/main">
   <p:cSld>
     <p:spTree>
@@ -6756,7 +7783,7 @@
 </p:sld>
 </file>
 
-<file path=ppt/slides/slide25.xml><?xml version="1.0" encoding="utf-8"?>
+<file path=ppt/slides/slide27.xml><?xml version="1.0" encoding="utf-8"?>
 <p:sld xmlns:a="http://schemas.openxmlformats.org/drawingml/2006/main" xmlns:r="http://schemas.openxmlformats.org/officeDocument/2006/relationships" xmlns:p="http://schemas.openxmlformats.org/presentationml/2006/main">
   <p:cSld>
     <p:spTree>
@@ -7803,6 +8830,56 @@
               </a:rPr>
               <a:t>Functional and Non-functional</a:t>
             </a:r>
+            <a:endParaRPr lang="en-ZA" sz="2400" kern="100" dirty="0">
+              <a:latin typeface="ADLaM Display" panose="02010000000000000000" pitchFamily="2" charset="0"/>
+              <a:ea typeface="ADLaM Display" panose="02010000000000000000" pitchFamily="2" charset="0"/>
+              <a:cs typeface="ADLaM Display" panose="02010000000000000000" pitchFamily="2" charset="0"/>
+            </a:endParaRPr>
+          </a:p>
+          <a:p>
+            <a:pPr marL="1200150" lvl="2" indent="-285750">
+              <a:lnSpc>
+                <a:spcPct val="107000"/>
+              </a:lnSpc>
+              <a:spcBef>
+                <a:spcPts val="0"/>
+              </a:spcBef>
+              <a:buFont typeface="Symbol" panose="05050102010706020507" pitchFamily="18" charset="2"/>
+              <a:buChar char=""/>
+            </a:pPr>
+            <a:endParaRPr lang="en-ZA" sz="2400" kern="100" dirty="0">
+              <a:latin typeface="ADLaM Display" panose="02010000000000000000" pitchFamily="2" charset="0"/>
+              <a:ea typeface="ADLaM Display" panose="02010000000000000000" pitchFamily="2" charset="0"/>
+              <a:cs typeface="ADLaM Display" panose="02010000000000000000" pitchFamily="2" charset="0"/>
+            </a:endParaRPr>
+          </a:p>
+          <a:p>
+            <a:pPr marL="914400" lvl="2" indent="0">
+              <a:lnSpc>
+                <a:spcPct val="107000"/>
+              </a:lnSpc>
+              <a:spcBef>
+                <a:spcPts val="0"/>
+              </a:spcBef>
+              <a:buNone/>
+            </a:pPr>
+            <a:endParaRPr lang="en-ZA" sz="1600" kern="100" dirty="0">
+              <a:latin typeface="ADLaM Display" panose="02010000000000000000" pitchFamily="2" charset="0"/>
+              <a:ea typeface="ADLaM Display" panose="02010000000000000000" pitchFamily="2" charset="0"/>
+              <a:cs typeface="ADLaM Display" panose="02010000000000000000" pitchFamily="2" charset="0"/>
+            </a:endParaRPr>
+          </a:p>
+          <a:p>
+            <a:pPr marL="1200150" lvl="2" indent="-285750">
+              <a:lnSpc>
+                <a:spcPct val="107000"/>
+              </a:lnSpc>
+              <a:spcBef>
+                <a:spcPts val="0"/>
+              </a:spcBef>
+              <a:buFont typeface="Symbol" panose="05050102010706020507" pitchFamily="18" charset="2"/>
+              <a:buChar char=""/>
+            </a:pPr>
             <a:endParaRPr lang="en-ZA" sz="1600" kern="100" dirty="0">
               <a:effectLst/>
               <a:latin typeface="ADLaM Display" panose="02010000000000000000" pitchFamily="2" charset="0"/>

</xml_diff>